<commit_message>
"Mi Amigo Artificial ppt"
</commit_message>
<xml_diff>
--- a/Mi amigo artificial - copia.pptx
+++ b/Mi amigo artificial - copia.pptx
@@ -6,24 +6,25 @@
     <p:sldMasterId id="2147483685" r:id="rId2"/>
   </p:sldMasterIdLst>
   <p:notesMasterIdLst>
-    <p:notesMasterId r:id="rId18"/>
+    <p:notesMasterId r:id="rId19"/>
   </p:notesMasterIdLst>
   <p:sldIdLst>
     <p:sldId id="256" r:id="rId3"/>
     <p:sldId id="271" r:id="rId4"/>
-    <p:sldId id="278" r:id="rId5"/>
-    <p:sldId id="275" r:id="rId6"/>
-    <p:sldId id="279" r:id="rId7"/>
-    <p:sldId id="270" r:id="rId8"/>
-    <p:sldId id="257" r:id="rId9"/>
-    <p:sldId id="258" r:id="rId10"/>
-    <p:sldId id="259" r:id="rId11"/>
-    <p:sldId id="260" r:id="rId12"/>
-    <p:sldId id="264" r:id="rId13"/>
-    <p:sldId id="262" r:id="rId14"/>
-    <p:sldId id="265" r:id="rId15"/>
-    <p:sldId id="281" r:id="rId16"/>
-    <p:sldId id="280" r:id="rId17"/>
+    <p:sldId id="282" r:id="rId5"/>
+    <p:sldId id="278" r:id="rId6"/>
+    <p:sldId id="275" r:id="rId7"/>
+    <p:sldId id="279" r:id="rId8"/>
+    <p:sldId id="270" r:id="rId9"/>
+    <p:sldId id="257" r:id="rId10"/>
+    <p:sldId id="258" r:id="rId11"/>
+    <p:sldId id="259" r:id="rId12"/>
+    <p:sldId id="260" r:id="rId13"/>
+    <p:sldId id="264" r:id="rId14"/>
+    <p:sldId id="262" r:id="rId15"/>
+    <p:sldId id="265" r:id="rId16"/>
+    <p:sldId id="281" r:id="rId17"/>
+    <p:sldId id="280" r:id="rId18"/>
   </p:sldIdLst>
   <p:sldSz cx="12192000" cy="6858000"/>
   <p:notesSz cx="6858000" cy="9144000"/>
@@ -816,7 +817,7 @@
     </p:spTree>
     <p:extLst>
       <p:ext uri="{BB962C8B-B14F-4D97-AF65-F5344CB8AC3E}">
-        <p14:creationId xmlns:p14="http://schemas.microsoft.com/office/powerpoint/2010/main" val="3694800211"/>
+        <p14:creationId xmlns:p14="http://schemas.microsoft.com/office/powerpoint/2010/main" val="1491370551"/>
       </p:ext>
     </p:extLst>
   </p:cSld>
@@ -925,7 +926,7 @@
     </p:spTree>
     <p:extLst>
       <p:ext uri="{BB962C8B-B14F-4D97-AF65-F5344CB8AC3E}">
-        <p14:creationId xmlns:p14="http://schemas.microsoft.com/office/powerpoint/2010/main" val="3328799347"/>
+        <p14:creationId xmlns:p14="http://schemas.microsoft.com/office/powerpoint/2010/main" val="3694800211"/>
       </p:ext>
     </p:extLst>
   </p:cSld>
@@ -1034,6 +1035,115 @@
     </p:spTree>
     <p:extLst>
       <p:ext uri="{BB962C8B-B14F-4D97-AF65-F5344CB8AC3E}">
+        <p14:creationId xmlns:p14="http://schemas.microsoft.com/office/powerpoint/2010/main" val="3328799347"/>
+      </p:ext>
+    </p:extLst>
+  </p:cSld>
+  <p:clrMapOvr>
+    <a:masterClrMapping/>
+  </p:clrMapOvr>
+</p:notes>
+</file>
+
+<file path=ppt/notesSlides/notesSlide5.xml><?xml version="1.0" encoding="utf-8"?>
+<p:notes xmlns:a="http://schemas.openxmlformats.org/drawingml/2006/main" xmlns:r="http://schemas.openxmlformats.org/officeDocument/2006/relationships" xmlns:p="http://schemas.openxmlformats.org/presentationml/2006/main" showMasterSp="0" showMasterPhAnim="0">
+  <p:cSld>
+    <p:spTree>
+      <p:nvGrpSpPr>
+        <p:cNvPr id="1" name="Shape 684"/>
+        <p:cNvGrpSpPr/>
+        <p:nvPr/>
+      </p:nvGrpSpPr>
+      <p:grpSpPr>
+        <a:xfrm>
+          <a:off x="0" y="0"/>
+          <a:ext cx="0" cy="0"/>
+          <a:chOff x="0" y="0"/>
+          <a:chExt cx="0" cy="0"/>
+        </a:xfrm>
+      </p:grpSpPr>
+      <p:sp>
+        <p:nvSpPr>
+          <p:cNvPr id="685" name="Google Shape;685;gbd6c00e730_0_89:notes"/>
+          <p:cNvSpPr>
+            <a:spLocks noGrp="1" noRot="1" noChangeAspect="1"/>
+          </p:cNvSpPr>
+          <p:nvPr>
+            <p:ph type="sldImg" idx="2"/>
+          </p:nvPr>
+        </p:nvSpPr>
+        <p:spPr>
+          <a:xfrm>
+            <a:off x="381000" y="685800"/>
+            <a:ext cx="6096000" cy="3429000"/>
+          </a:xfrm>
+          <a:custGeom>
+            <a:avLst/>
+            <a:gdLst/>
+            <a:ahLst/>
+            <a:cxnLst/>
+            <a:rect l="l" t="t" r="r" b="b"/>
+            <a:pathLst>
+              <a:path w="120000" h="120000" extrusionOk="0">
+                <a:moveTo>
+                  <a:pt x="0" y="0"/>
+                </a:moveTo>
+                <a:lnTo>
+                  <a:pt x="120000" y="0"/>
+                </a:lnTo>
+                <a:lnTo>
+                  <a:pt x="120000" y="120000"/>
+                </a:lnTo>
+                <a:lnTo>
+                  <a:pt x="0" y="120000"/>
+                </a:lnTo>
+                <a:close/>
+              </a:path>
+            </a:pathLst>
+          </a:custGeom>
+        </p:spPr>
+      </p:sp>
+      <p:sp>
+        <p:nvSpPr>
+          <p:cNvPr id="686" name="Google Shape;686;gbd6c00e730_0_89:notes"/>
+          <p:cNvSpPr txBox="1">
+            <a:spLocks noGrp="1"/>
+          </p:cNvSpPr>
+          <p:nvPr>
+            <p:ph type="body" idx="1"/>
+          </p:nvPr>
+        </p:nvSpPr>
+        <p:spPr>
+          <a:xfrm>
+            <a:off x="685800" y="4343400"/>
+            <a:ext cx="5486400" cy="4114800"/>
+          </a:xfrm>
+          <a:prstGeom prst="rect">
+            <a:avLst/>
+          </a:prstGeom>
+        </p:spPr>
+        <p:txBody>
+          <a:bodyPr spcFirstLastPara="1" wrap="square" lIns="91425" tIns="91425" rIns="91425" bIns="91425" anchor="t" anchorCtr="0">
+            <a:noAutofit/>
+          </a:bodyPr>
+          <a:lstStyle/>
+          <a:p>
+            <a:pPr marL="0" lvl="0" indent="0" algn="l" rtl="0">
+              <a:spcBef>
+                <a:spcPts val="0"/>
+              </a:spcBef>
+              <a:spcAft>
+                <a:spcPts val="0"/>
+              </a:spcAft>
+              <a:buNone/>
+            </a:pPr>
+            <a:endParaRPr/>
+          </a:p>
+        </p:txBody>
+      </p:sp>
+    </p:spTree>
+    <p:extLst>
+      <p:ext uri="{BB962C8B-B14F-4D97-AF65-F5344CB8AC3E}">
         <p14:creationId xmlns:p14="http://schemas.microsoft.com/office/powerpoint/2010/main" val="2433346914"/>
       </p:ext>
     </p:extLst>
@@ -1044,7 +1154,7 @@
 </p:notes>
 </file>
 
-<file path=ppt/notesSlides/notesSlide5.xml><?xml version="1.0" encoding="utf-8"?>
+<file path=ppt/notesSlides/notesSlide6.xml><?xml version="1.0" encoding="utf-8"?>
 <p:notes xmlns:a="http://schemas.openxmlformats.org/drawingml/2006/main" xmlns:r="http://schemas.openxmlformats.org/officeDocument/2006/relationships" xmlns:p="http://schemas.openxmlformats.org/presentationml/2006/main" showMasterSp="0" showMasterPhAnim="0">
   <p:cSld>
     <p:spTree>
@@ -36261,7 +36371,7 @@
         <p:spPr>
           <a:xfrm flipH="1">
             <a:off x="1296231" y="782633"/>
-            <a:ext cx="6691321" cy="714000"/>
+            <a:ext cx="5884497" cy="714000"/>
           </a:xfrm>
         </p:spPr>
         <p:txBody>
@@ -36270,7 +36380,7 @@
           <a:p>
             <a:r>
               <a:rPr lang="es-ES" sz="4000" dirty="0"/>
-              <a:t>Historias </a:t>
+              <a:t>Chistes </a:t>
             </a:r>
             <a:r>
               <a:rPr lang="es-ES" sz="4000" dirty="0">
@@ -36306,8 +36416,8 @@
         </p:nvSpPr>
         <p:spPr>
           <a:xfrm>
-            <a:off x="2787575" y="1998656"/>
-            <a:ext cx="6616850" cy="3989768"/>
+            <a:off x="2895539" y="1921304"/>
+            <a:ext cx="7725416" cy="4508234"/>
           </a:xfrm>
         </p:spPr>
         <p:txBody>
@@ -36316,17 +36426,15 @@
           <a:p>
             <a:r>
               <a:rPr lang="es-ES" sz="3200" dirty="0"/>
-              <a:t>//Presentación</a:t>
-            </a:r>
-          </a:p>
-          <a:p>
+              <a:t>	</a:t>
+            </a:r>
             <a:r>
               <a:rPr lang="es-ES" sz="3200" dirty="0">
                 <a:solidFill>
                   <a:schemeClr val="tx2"/>
                 </a:solidFill>
               </a:rPr>
-              <a:t>	Menú Libros()</a:t>
+              <a:t>Menú Chistes() </a:t>
             </a:r>
             <a:endParaRPr lang="es-ES" sz="3600" dirty="0">
               <a:solidFill>
@@ -36336,6 +36444,32 @@
           </a:p>
           <a:p>
             <a:r>
+              <a:rPr lang="es-ES" sz="3200" dirty="0">
+                <a:solidFill>
+                  <a:srgbClr val="92D050"/>
+                </a:solidFill>
+              </a:rPr>
+              <a:t>	</a:t>
+            </a:r>
+            <a:r>
+              <a:rPr lang="es-ES" sz="3200" dirty="0">
+                <a:solidFill>
+                  <a:schemeClr val="accent4"/>
+                </a:solidFill>
+              </a:rPr>
+              <a:t>|</a:t>
+            </a:r>
+            <a:r>
+              <a:rPr lang="es-ES" sz="3200" dirty="0">
+                <a:solidFill>
+                  <a:srgbClr val="92D050"/>
+                </a:solidFill>
+              </a:rPr>
+              <a:t>	1) Chistes Blancos</a:t>
+            </a:r>
+          </a:p>
+          <a:p>
+            <a:r>
               <a:rPr lang="es-ES" sz="3200" dirty="0"/>
               <a:t>	</a:t>
             </a:r>
@@ -36349,15 +36483,15 @@
             </a:r>
             <a:r>
               <a:rPr lang="es-ES" sz="3200" dirty="0"/>
-              <a:t>	</a:t>
+              <a:t>		</a:t>
             </a:r>
             <a:r>
               <a:rPr lang="es-ES" sz="3200" dirty="0">
                 <a:solidFill>
-                  <a:srgbClr val="92D050"/>
+                  <a:schemeClr val="tx2"/>
                 </a:solidFill>
               </a:rPr>
-              <a:t>1) Libros de drama:</a:t>
+              <a:t>Contenido().</a:t>
             </a:r>
           </a:p>
           <a:p>
@@ -36375,23 +36509,15 @@
             </a:r>
             <a:r>
               <a:rPr lang="es-ES" sz="3200" dirty="0"/>
-              <a:t>		</a:t>
-            </a:r>
-            <a:r>
-              <a:rPr lang="es-ES" sz="3200" dirty="0" err="1">
-                <a:solidFill>
-                  <a:schemeClr val="tx2"/>
+              <a:t>	</a:t>
+            </a:r>
+            <a:r>
+              <a:rPr lang="es-ES" sz="3200" dirty="0">
+                <a:solidFill>
+                  <a:srgbClr val="92D050"/>
                 </a:solidFill>
               </a:rPr>
-              <a:t>LibrosDrama</a:t>
-            </a:r>
-            <a:r>
-              <a:rPr lang="es-ES" sz="3200" dirty="0">
-                <a:solidFill>
-                  <a:schemeClr val="tx2"/>
-                </a:solidFill>
-              </a:rPr>
-              <a:t>()</a:t>
+              <a:t>2) Chistes buenos</a:t>
             </a:r>
           </a:p>
           <a:p>
@@ -36409,15 +36535,15 @@
             </a:r>
             <a:r>
               <a:rPr lang="es-ES" sz="3200" dirty="0"/>
-              <a:t>	</a:t>
+              <a:t>		</a:t>
             </a:r>
             <a:r>
               <a:rPr lang="es-ES" sz="3200" dirty="0">
                 <a:solidFill>
-                  <a:srgbClr val="92D050"/>
+                  <a:schemeClr val="tx2"/>
                 </a:solidFill>
               </a:rPr>
-              <a:t>2) Libros de aventura:</a:t>
+              <a:t>Contenido().</a:t>
             </a:r>
           </a:p>
           <a:p>
@@ -36435,23 +36561,15 @@
             </a:r>
             <a:r>
               <a:rPr lang="es-ES" sz="3200" dirty="0"/>
-              <a:t>		</a:t>
-            </a:r>
-            <a:r>
-              <a:rPr lang="es-ES" sz="3200" dirty="0" err="1">
-                <a:solidFill>
-                  <a:schemeClr val="tx2"/>
+              <a:t>	</a:t>
+            </a:r>
+            <a:r>
+              <a:rPr lang="es-ES" sz="3200" dirty="0">
+                <a:solidFill>
+                  <a:srgbClr val="92D050"/>
                 </a:solidFill>
               </a:rPr>
-              <a:t>LibrosAventura</a:t>
-            </a:r>
-            <a:r>
-              <a:rPr lang="es-ES" sz="3200" dirty="0">
-                <a:solidFill>
-                  <a:schemeClr val="tx2"/>
-                </a:solidFill>
-              </a:rPr>
-              <a:t>()</a:t>
+              <a:t>3) Chistes inteligentes</a:t>
             </a:r>
           </a:p>
           <a:p>
@@ -36469,15 +36587,15 @@
             </a:r>
             <a:r>
               <a:rPr lang="es-ES" sz="3200" dirty="0"/>
-              <a:t>	</a:t>
+              <a:t>		</a:t>
             </a:r>
             <a:r>
               <a:rPr lang="es-ES" sz="3200" dirty="0">
                 <a:solidFill>
-                  <a:srgbClr val="92D050"/>
+                  <a:schemeClr val="tx2"/>
                 </a:solidFill>
               </a:rPr>
-              <a:t>3) Libros de comedia:</a:t>
+              <a:t>Contenido().</a:t>
             </a:r>
           </a:p>
           <a:p>
@@ -36495,23 +36613,15 @@
             </a:r>
             <a:r>
               <a:rPr lang="es-ES" sz="3200" dirty="0"/>
-              <a:t>		</a:t>
-            </a:r>
-            <a:r>
-              <a:rPr lang="es-ES" sz="3200" dirty="0" err="1">
-                <a:solidFill>
-                  <a:schemeClr val="tx2"/>
+              <a:t>	</a:t>
+            </a:r>
+            <a:r>
+              <a:rPr lang="es-ES" sz="3200" dirty="0">
+                <a:solidFill>
+                  <a:srgbClr val="92D050"/>
                 </a:solidFill>
               </a:rPr>
-              <a:t>LibrosComedia</a:t>
-            </a:r>
-            <a:r>
-              <a:rPr lang="es-ES" sz="3200" dirty="0">
-                <a:solidFill>
-                  <a:schemeClr val="tx2"/>
-                </a:solidFill>
-              </a:rPr>
-              <a:t>()</a:t>
+              <a:t>4) Chistes rojos</a:t>
             </a:r>
           </a:p>
           <a:p>
@@ -36529,23 +36639,57 @@
             </a:r>
             <a:r>
               <a:rPr lang="es-ES" sz="3200" dirty="0"/>
+              <a:t>		</a:t>
+            </a:r>
+            <a:r>
+              <a:rPr lang="es-ES" sz="3200" dirty="0">
+                <a:solidFill>
+                  <a:schemeClr val="tx2"/>
+                </a:solidFill>
+              </a:rPr>
+              <a:t>Contenido().</a:t>
+            </a:r>
+          </a:p>
+          <a:p>
+            <a:r>
+              <a:rPr lang="es-ES" sz="3200" dirty="0"/>
               <a:t>	</a:t>
             </a:r>
             <a:r>
               <a:rPr lang="es-ES" sz="3200" dirty="0">
                 <a:solidFill>
+                  <a:schemeClr val="accent4"/>
+                </a:solidFill>
+              </a:rPr>
+              <a:t>|</a:t>
+            </a:r>
+            <a:r>
+              <a:rPr lang="es-ES" sz="3200" dirty="0"/>
+              <a:t>	</a:t>
+            </a:r>
+            <a:r>
+              <a:rPr lang="es-ES" sz="3200" dirty="0">
+                <a:solidFill>
                   <a:srgbClr val="92D050"/>
                 </a:solidFill>
               </a:rPr>
-              <a:t>4) volver:</a:t>
-            </a:r>
-          </a:p>
-          <a:p>
-            <a:r>
-              <a:rPr lang="es-ES" sz="3200" dirty="0"/>
-              <a:t>	 </a:t>
-            </a:r>
-            <a:endParaRPr lang="es-PE" sz="3200" dirty="0"/>
+              <a:t>5) Volver</a:t>
+            </a:r>
+          </a:p>
+          <a:p>
+            <a:r>
+              <a:rPr lang="es-ES" sz="3200" dirty="0">
+                <a:solidFill>
+                  <a:srgbClr val="92D050"/>
+                </a:solidFill>
+              </a:rPr>
+              <a:t>	</a:t>
+            </a:r>
+            <a:endParaRPr lang="es-PE" sz="3200" dirty="0">
+              <a:solidFill>
+                <a:schemeClr val="accent6"/>
+              </a:solidFill>
+            </a:endParaRPr>
           </a:p>
         </p:txBody>
       </p:sp>
@@ -36564,7 +36708,7 @@
         <p:spPr>
           <a:xfrm>
             <a:off x="1877472" y="215153"/>
-            <a:ext cx="2282997" cy="338554"/>
+            <a:ext cx="2036135" cy="338554"/>
           </a:xfrm>
           <a:prstGeom prst="rect">
             <a:avLst/>
@@ -36586,7 +36730,7 @@
                 <a:ea typeface="Fira Code" panose="020B0809050000020004" pitchFamily="49" charset="0"/>
                 <a:cs typeface="Fira Code" panose="020B0809050000020004" pitchFamily="49" charset="0"/>
               </a:rPr>
-              <a:t>Historias.package</a:t>
+              <a:t>Chistes.package</a:t>
             </a:r>
           </a:p>
         </p:txBody>
@@ -36596,7 +36740,7 @@
           <p:cNvPr id="3" name="Picture 2" descr="Historia de Python - Wikipedia, la enciclopedia libre">
             <a:extLst>
               <a:ext uri="{FF2B5EF4-FFF2-40B4-BE49-F238E27FC236}">
-                <a16:creationId xmlns:a16="http://schemas.microsoft.com/office/drawing/2014/main" id="{EE7A862E-9956-10E6-B12F-DED3FE4D15AE}"/>
+                <a16:creationId xmlns:a16="http://schemas.microsoft.com/office/drawing/2014/main" id="{3CA948B0-4182-097C-3647-301A3095EB18}"/>
               </a:ext>
             </a:extLst>
           </p:cNvPr>
@@ -36641,7 +36785,7 @@
     </p:spTree>
     <p:extLst>
       <p:ext uri="{BB962C8B-B14F-4D97-AF65-F5344CB8AC3E}">
-        <p14:creationId xmlns:p14="http://schemas.microsoft.com/office/powerpoint/2010/main" val="694929372"/>
+        <p14:creationId xmlns:p14="http://schemas.microsoft.com/office/powerpoint/2010/main" val="2379966933"/>
       </p:ext>
     </p:extLst>
   </p:cSld>
@@ -36686,8 +36830,8 @@
         </p:nvSpPr>
         <p:spPr>
           <a:xfrm flipH="1">
-            <a:off x="1296229" y="782633"/>
-            <a:ext cx="8170499" cy="714000"/>
+            <a:off x="1296231" y="782633"/>
+            <a:ext cx="6691321" cy="714000"/>
           </a:xfrm>
         </p:spPr>
         <p:txBody>
@@ -36696,7 +36840,7 @@
           <a:p>
             <a:r>
               <a:rPr lang="es-ES" sz="4000" dirty="0"/>
-              <a:t>Recomendaciones </a:t>
+              <a:t>Historias </a:t>
             </a:r>
             <a:r>
               <a:rPr lang="es-ES" sz="4000" dirty="0">
@@ -36732,8 +36876,8 @@
         </p:nvSpPr>
         <p:spPr>
           <a:xfrm>
-            <a:off x="2389921" y="3276600"/>
-            <a:ext cx="9264195" cy="1460233"/>
+            <a:off x="2787575" y="1998656"/>
+            <a:ext cx="6616850" cy="3989768"/>
           </a:xfrm>
         </p:spPr>
         <p:txBody>
@@ -36741,20 +36885,20 @@
           <a:lstStyle/>
           <a:p>
             <a:r>
-              <a:rPr lang="es-ES" sz="2800" dirty="0"/>
+              <a:rPr lang="es-ES" sz="3200" dirty="0"/>
               <a:t>//Presentación</a:t>
             </a:r>
           </a:p>
           <a:p>
             <a:r>
-              <a:rPr lang="es-ES" sz="2800" dirty="0">
+              <a:rPr lang="es-ES" sz="3200" dirty="0">
                 <a:solidFill>
                   <a:schemeClr val="tx2"/>
                 </a:solidFill>
               </a:rPr>
-              <a:t>	Menú Recomendaciones() </a:t>
-            </a:r>
-            <a:endParaRPr lang="es-ES" sz="3200" dirty="0">
+              <a:t>	Menú Libros()</a:t>
+            </a:r>
+            <a:endParaRPr lang="es-ES" sz="3600" dirty="0">
               <a:solidFill>
                 <a:schemeClr val="accent6"/>
               </a:solidFill>
@@ -36762,11 +36906,11 @@
           </a:p>
           <a:p>
             <a:r>
-              <a:rPr lang="es-ES" sz="2800" dirty="0"/>
+              <a:rPr lang="es-ES" sz="3200" dirty="0"/>
               <a:t>	</a:t>
             </a:r>
             <a:r>
-              <a:rPr lang="es-ES" sz="2800" dirty="0">
+              <a:rPr lang="es-ES" sz="3200" dirty="0">
                 <a:solidFill>
                   <a:schemeClr val="accent4"/>
                 </a:solidFill>
@@ -36774,25 +36918,25 @@
               <a:t>|</a:t>
             </a:r>
             <a:r>
-              <a:rPr lang="es-ES" sz="2800" dirty="0"/>
+              <a:rPr lang="es-ES" sz="3200" dirty="0"/>
               <a:t>	</a:t>
             </a:r>
             <a:r>
-              <a:rPr lang="es-ES" sz="2800" dirty="0">
+              <a:rPr lang="es-ES" sz="3200" dirty="0">
                 <a:solidFill>
                   <a:srgbClr val="92D050"/>
                 </a:solidFill>
               </a:rPr>
-              <a:t>1) Recomendaciones gastronómicas.</a:t>
-            </a:r>
-          </a:p>
-          <a:p>
-            <a:r>
-              <a:rPr lang="es-ES" sz="2800" dirty="0"/>
+              <a:t>1) Libros de drama:</a:t>
+            </a:r>
+          </a:p>
+          <a:p>
+            <a:r>
+              <a:rPr lang="es-ES" sz="3200" dirty="0"/>
               <a:t>	</a:t>
             </a:r>
             <a:r>
-              <a:rPr lang="es-ES" sz="2800" dirty="0">
+              <a:rPr lang="es-ES" sz="3200" dirty="0">
                 <a:solidFill>
                   <a:schemeClr val="accent4"/>
                 </a:solidFill>
@@ -36800,19 +36944,19 @@
               <a:t>|</a:t>
             </a:r>
             <a:r>
-              <a:rPr lang="es-ES" sz="2800" dirty="0"/>
+              <a:rPr lang="es-ES" sz="3200" dirty="0"/>
               <a:t>		</a:t>
             </a:r>
             <a:r>
-              <a:rPr lang="es-ES" sz="2800" dirty="0" err="1">
+              <a:rPr lang="es-ES" sz="3200" dirty="0" err="1">
                 <a:solidFill>
                   <a:schemeClr val="tx2"/>
                 </a:solidFill>
               </a:rPr>
-              <a:t>recomendacionGastronomica</a:t>
-            </a:r>
-            <a:r>
-              <a:rPr lang="es-ES" sz="2800" dirty="0">
+              <a:t>LibrosDrama</a:t>
+            </a:r>
+            <a:r>
+              <a:rPr lang="es-ES" sz="3200" dirty="0">
                 <a:solidFill>
                   <a:schemeClr val="tx2"/>
                 </a:solidFill>
@@ -36822,11 +36966,11 @@
           </a:p>
           <a:p>
             <a:r>
-              <a:rPr lang="es-ES" sz="2800" dirty="0"/>
+              <a:rPr lang="es-ES" sz="3200" dirty="0"/>
               <a:t>	</a:t>
             </a:r>
             <a:r>
-              <a:rPr lang="es-ES" sz="2800" dirty="0">
+              <a:rPr lang="es-ES" sz="3200" dirty="0">
                 <a:solidFill>
                   <a:schemeClr val="accent4"/>
                 </a:solidFill>
@@ -36834,25 +36978,25 @@
               <a:t>|</a:t>
             </a:r>
             <a:r>
-              <a:rPr lang="es-ES" sz="2800" dirty="0"/>
+              <a:rPr lang="es-ES" sz="3200" dirty="0"/>
               <a:t>	</a:t>
             </a:r>
             <a:r>
-              <a:rPr lang="es-ES" sz="2800" dirty="0">
+              <a:rPr lang="es-ES" sz="3200" dirty="0">
                 <a:solidFill>
                   <a:srgbClr val="92D050"/>
                 </a:solidFill>
               </a:rPr>
-              <a:t>2) Recomendaciones académicas.</a:t>
-            </a:r>
-          </a:p>
-          <a:p>
-            <a:r>
-              <a:rPr lang="es-ES" sz="2800" dirty="0"/>
+              <a:t>2) Libros de aventura:</a:t>
+            </a:r>
+          </a:p>
+          <a:p>
+            <a:r>
+              <a:rPr lang="es-ES" sz="3200" dirty="0"/>
               <a:t>	</a:t>
             </a:r>
             <a:r>
-              <a:rPr lang="es-ES" sz="2800" dirty="0">
+              <a:rPr lang="es-ES" sz="3200" dirty="0">
                 <a:solidFill>
                   <a:schemeClr val="accent4"/>
                 </a:solidFill>
@@ -36860,19 +37004,19 @@
               <a:t>|</a:t>
             </a:r>
             <a:r>
-              <a:rPr lang="es-ES" sz="2800" dirty="0"/>
+              <a:rPr lang="es-ES" sz="3200" dirty="0"/>
               <a:t>		</a:t>
             </a:r>
             <a:r>
-              <a:rPr lang="es-ES" sz="2800" dirty="0" err="1">
+              <a:rPr lang="es-ES" sz="3200" dirty="0" err="1">
                 <a:solidFill>
                   <a:schemeClr val="tx2"/>
                 </a:solidFill>
               </a:rPr>
-              <a:t>recomendacionAcademica</a:t>
-            </a:r>
-            <a:r>
-              <a:rPr lang="es-ES" sz="2800" dirty="0">
+              <a:t>LibrosAventura</a:t>
+            </a:r>
+            <a:r>
+              <a:rPr lang="es-ES" sz="3200" dirty="0">
                 <a:solidFill>
                   <a:schemeClr val="tx2"/>
                 </a:solidFill>
@@ -36882,11 +37026,11 @@
           </a:p>
           <a:p>
             <a:r>
-              <a:rPr lang="es-ES" sz="2800" dirty="0"/>
+              <a:rPr lang="es-ES" sz="3200" dirty="0"/>
               <a:t>	</a:t>
             </a:r>
             <a:r>
-              <a:rPr lang="es-ES" sz="2800" dirty="0">
+              <a:rPr lang="es-ES" sz="3200" dirty="0">
                 <a:solidFill>
                   <a:schemeClr val="accent4"/>
                 </a:solidFill>
@@ -36894,27 +37038,84 @@
               <a:t>|</a:t>
             </a:r>
             <a:r>
-              <a:rPr lang="es-ES" sz="2800" dirty="0"/>
+              <a:rPr lang="es-ES" sz="3200" dirty="0"/>
               <a:t>	</a:t>
             </a:r>
             <a:r>
-              <a:rPr lang="es-ES" sz="2800" dirty="0">
+              <a:rPr lang="es-ES" sz="3200" dirty="0">
                 <a:solidFill>
                   <a:srgbClr val="92D050"/>
                 </a:solidFill>
               </a:rPr>
-              <a:t>3) Volver.	</a:t>
-            </a:r>
-          </a:p>
-          <a:p>
-            <a:r>
-              <a:rPr lang="es-ES" sz="2800" dirty="0"/>
+              <a:t>3) Libros de comedia:</a:t>
+            </a:r>
+          </a:p>
+          <a:p>
+            <a:r>
+              <a:rPr lang="es-ES" sz="3200" dirty="0"/>
               <a:t>	</a:t>
             </a:r>
-            <a:endParaRPr lang="es-ES" sz="3200" dirty="0"/>
-          </a:p>
-          <a:p>
-            <a:endParaRPr lang="es-PE" dirty="0"/>
+            <a:r>
+              <a:rPr lang="es-ES" sz="3200" dirty="0">
+                <a:solidFill>
+                  <a:schemeClr val="accent4"/>
+                </a:solidFill>
+              </a:rPr>
+              <a:t>|</a:t>
+            </a:r>
+            <a:r>
+              <a:rPr lang="es-ES" sz="3200" dirty="0"/>
+              <a:t>		</a:t>
+            </a:r>
+            <a:r>
+              <a:rPr lang="es-ES" sz="3200" dirty="0" err="1">
+                <a:solidFill>
+                  <a:schemeClr val="tx2"/>
+                </a:solidFill>
+              </a:rPr>
+              <a:t>LibrosComedia</a:t>
+            </a:r>
+            <a:r>
+              <a:rPr lang="es-ES" sz="3200" dirty="0">
+                <a:solidFill>
+                  <a:schemeClr val="tx2"/>
+                </a:solidFill>
+              </a:rPr>
+              <a:t>()</a:t>
+            </a:r>
+          </a:p>
+          <a:p>
+            <a:r>
+              <a:rPr lang="es-ES" sz="3200" dirty="0"/>
+              <a:t>	</a:t>
+            </a:r>
+            <a:r>
+              <a:rPr lang="es-ES" sz="3200" dirty="0">
+                <a:solidFill>
+                  <a:schemeClr val="accent4"/>
+                </a:solidFill>
+              </a:rPr>
+              <a:t>|</a:t>
+            </a:r>
+            <a:r>
+              <a:rPr lang="es-ES" sz="3200" dirty="0"/>
+              <a:t>	</a:t>
+            </a:r>
+            <a:r>
+              <a:rPr lang="es-ES" sz="3200" dirty="0">
+                <a:solidFill>
+                  <a:srgbClr val="92D050"/>
+                </a:solidFill>
+              </a:rPr>
+              <a:t>4) volver:</a:t>
+            </a:r>
+          </a:p>
+          <a:p>
+            <a:r>
+              <a:rPr lang="es-ES" sz="3200" dirty="0"/>
+              <a:t>	 </a:t>
+            </a:r>
+            <a:endParaRPr lang="es-PE" sz="3200" dirty="0"/>
           </a:p>
         </p:txBody>
       </p:sp>
@@ -36932,8 +37133,8 @@
         </p:nvSpPr>
         <p:spPr>
           <a:xfrm>
-            <a:off x="1474060" y="230801"/>
-            <a:ext cx="3023585" cy="338554"/>
+            <a:off x="1877472" y="215153"/>
+            <a:ext cx="2282997" cy="338554"/>
           </a:xfrm>
           <a:prstGeom prst="rect">
             <a:avLst/>
@@ -36955,7 +37156,7 @@
                 <a:ea typeface="Fira Code" panose="020B0809050000020004" pitchFamily="49" charset="0"/>
                 <a:cs typeface="Fira Code" panose="020B0809050000020004" pitchFamily="49" charset="0"/>
               </a:rPr>
-              <a:t>Recomendaciones.package</a:t>
+              <a:t>Historias.package</a:t>
             </a:r>
           </a:p>
         </p:txBody>
@@ -36965,7 +37166,7 @@
           <p:cNvPr id="3" name="Picture 2" descr="Historia de Python - Wikipedia, la enciclopedia libre">
             <a:extLst>
               <a:ext uri="{FF2B5EF4-FFF2-40B4-BE49-F238E27FC236}">
-                <a16:creationId xmlns:a16="http://schemas.microsoft.com/office/drawing/2014/main" id="{A9B2CCA8-A936-7F2E-4CE2-CB6EFF8CEE78}"/>
+                <a16:creationId xmlns:a16="http://schemas.microsoft.com/office/drawing/2014/main" id="{EE7A862E-9956-10E6-B12F-DED3FE4D15AE}"/>
               </a:ext>
             </a:extLst>
           </p:cNvPr>
@@ -37010,7 +37211,7 @@
     </p:spTree>
     <p:extLst>
       <p:ext uri="{BB962C8B-B14F-4D97-AF65-F5344CB8AC3E}">
-        <p14:creationId xmlns:p14="http://schemas.microsoft.com/office/powerpoint/2010/main" val="1796107851"/>
+        <p14:creationId xmlns:p14="http://schemas.microsoft.com/office/powerpoint/2010/main" val="694929372"/>
       </p:ext>
     </p:extLst>
   </p:cSld>
@@ -37055,8 +37256,8 @@
         </p:nvSpPr>
         <p:spPr>
           <a:xfrm flipH="1">
-            <a:off x="755690" y="713872"/>
-            <a:ext cx="11678356" cy="714000"/>
+            <a:off x="1296229" y="782633"/>
+            <a:ext cx="8170499" cy="714000"/>
           </a:xfrm>
         </p:spPr>
         <p:txBody>
@@ -37065,7 +37266,7 @@
           <a:p>
             <a:r>
               <a:rPr lang="es-ES" sz="4000" dirty="0"/>
-              <a:t>Interfaz y presentación </a:t>
+              <a:t>Recomendaciones </a:t>
             </a:r>
             <a:r>
               <a:rPr lang="es-ES" sz="4000" dirty="0">
@@ -37080,6 +37281,210 @@
                 <a:schemeClr val="accent2"/>
               </a:solidFill>
             </a:endParaRPr>
+          </a:p>
+        </p:txBody>
+      </p:sp>
+      <p:sp>
+        <p:nvSpPr>
+          <p:cNvPr id="4" name="Subtítulo 3">
+            <a:extLst>
+              <a:ext uri="{FF2B5EF4-FFF2-40B4-BE49-F238E27FC236}">
+                <a16:creationId xmlns:a16="http://schemas.microsoft.com/office/drawing/2014/main" id="{10D0C33B-6A9C-8DE9-0EC3-8C0AC40CF17F}"/>
+              </a:ext>
+            </a:extLst>
+          </p:cNvPr>
+          <p:cNvSpPr>
+            <a:spLocks noGrp="1"/>
+          </p:cNvSpPr>
+          <p:nvPr>
+            <p:ph type="subTitle" idx="1"/>
+          </p:nvPr>
+        </p:nvSpPr>
+        <p:spPr>
+          <a:xfrm>
+            <a:off x="2389921" y="3276600"/>
+            <a:ext cx="9264195" cy="1460233"/>
+          </a:xfrm>
+        </p:spPr>
+        <p:txBody>
+          <a:bodyPr/>
+          <a:lstStyle/>
+          <a:p>
+            <a:r>
+              <a:rPr lang="es-ES" sz="2800" dirty="0"/>
+              <a:t>//Presentación</a:t>
+            </a:r>
+          </a:p>
+          <a:p>
+            <a:r>
+              <a:rPr lang="es-ES" sz="2800" dirty="0">
+                <a:solidFill>
+                  <a:schemeClr val="tx2"/>
+                </a:solidFill>
+              </a:rPr>
+              <a:t>	Menú Recomendaciones() </a:t>
+            </a:r>
+            <a:endParaRPr lang="es-ES" sz="3200" dirty="0">
+              <a:solidFill>
+                <a:schemeClr val="accent6"/>
+              </a:solidFill>
+            </a:endParaRPr>
+          </a:p>
+          <a:p>
+            <a:r>
+              <a:rPr lang="es-ES" sz="2800" dirty="0"/>
+              <a:t>	</a:t>
+            </a:r>
+            <a:r>
+              <a:rPr lang="es-ES" sz="2800" dirty="0">
+                <a:solidFill>
+                  <a:schemeClr val="accent4"/>
+                </a:solidFill>
+              </a:rPr>
+              <a:t>|</a:t>
+            </a:r>
+            <a:r>
+              <a:rPr lang="es-ES" sz="2800" dirty="0"/>
+              <a:t>	</a:t>
+            </a:r>
+            <a:r>
+              <a:rPr lang="es-ES" sz="2800" dirty="0">
+                <a:solidFill>
+                  <a:srgbClr val="92D050"/>
+                </a:solidFill>
+              </a:rPr>
+              <a:t>1) Recomendaciones gastronómicas.</a:t>
+            </a:r>
+          </a:p>
+          <a:p>
+            <a:r>
+              <a:rPr lang="es-ES" sz="2800" dirty="0"/>
+              <a:t>	</a:t>
+            </a:r>
+            <a:r>
+              <a:rPr lang="es-ES" sz="2800" dirty="0">
+                <a:solidFill>
+                  <a:schemeClr val="accent4"/>
+                </a:solidFill>
+              </a:rPr>
+              <a:t>|</a:t>
+            </a:r>
+            <a:r>
+              <a:rPr lang="es-ES" sz="2800" dirty="0"/>
+              <a:t>		</a:t>
+            </a:r>
+            <a:r>
+              <a:rPr lang="es-ES" sz="2800" dirty="0" err="1">
+                <a:solidFill>
+                  <a:schemeClr val="tx2"/>
+                </a:solidFill>
+              </a:rPr>
+              <a:t>recomendacionGastronomica</a:t>
+            </a:r>
+            <a:r>
+              <a:rPr lang="es-ES" sz="2800" dirty="0">
+                <a:solidFill>
+                  <a:schemeClr val="tx2"/>
+                </a:solidFill>
+              </a:rPr>
+              <a:t>()</a:t>
+            </a:r>
+          </a:p>
+          <a:p>
+            <a:r>
+              <a:rPr lang="es-ES" sz="2800" dirty="0"/>
+              <a:t>	</a:t>
+            </a:r>
+            <a:r>
+              <a:rPr lang="es-ES" sz="2800" dirty="0">
+                <a:solidFill>
+                  <a:schemeClr val="accent4"/>
+                </a:solidFill>
+              </a:rPr>
+              <a:t>|</a:t>
+            </a:r>
+            <a:r>
+              <a:rPr lang="es-ES" sz="2800" dirty="0"/>
+              <a:t>	</a:t>
+            </a:r>
+            <a:r>
+              <a:rPr lang="es-ES" sz="2800" dirty="0">
+                <a:solidFill>
+                  <a:srgbClr val="92D050"/>
+                </a:solidFill>
+              </a:rPr>
+              <a:t>2) Recomendaciones académicas.</a:t>
+            </a:r>
+          </a:p>
+          <a:p>
+            <a:r>
+              <a:rPr lang="es-ES" sz="2800" dirty="0"/>
+              <a:t>	</a:t>
+            </a:r>
+            <a:r>
+              <a:rPr lang="es-ES" sz="2800" dirty="0">
+                <a:solidFill>
+                  <a:schemeClr val="accent4"/>
+                </a:solidFill>
+              </a:rPr>
+              <a:t>|</a:t>
+            </a:r>
+            <a:r>
+              <a:rPr lang="es-ES" sz="2800" dirty="0"/>
+              <a:t>		</a:t>
+            </a:r>
+            <a:r>
+              <a:rPr lang="es-ES" sz="2800" dirty="0" err="1">
+                <a:solidFill>
+                  <a:schemeClr val="tx2"/>
+                </a:solidFill>
+              </a:rPr>
+              <a:t>recomendacionAcademica</a:t>
+            </a:r>
+            <a:r>
+              <a:rPr lang="es-ES" sz="2800" dirty="0">
+                <a:solidFill>
+                  <a:schemeClr val="tx2"/>
+                </a:solidFill>
+              </a:rPr>
+              <a:t>()</a:t>
+            </a:r>
+          </a:p>
+          <a:p>
+            <a:r>
+              <a:rPr lang="es-ES" sz="2800" dirty="0"/>
+              <a:t>	</a:t>
+            </a:r>
+            <a:r>
+              <a:rPr lang="es-ES" sz="2800" dirty="0">
+                <a:solidFill>
+                  <a:schemeClr val="accent4"/>
+                </a:solidFill>
+              </a:rPr>
+              <a:t>|</a:t>
+            </a:r>
+            <a:r>
+              <a:rPr lang="es-ES" sz="2800" dirty="0"/>
+              <a:t>	</a:t>
+            </a:r>
+            <a:r>
+              <a:rPr lang="es-ES" sz="2800" dirty="0">
+                <a:solidFill>
+                  <a:srgbClr val="92D050"/>
+                </a:solidFill>
+              </a:rPr>
+              <a:t>3) Volver.	</a:t>
+            </a:r>
+          </a:p>
+          <a:p>
+            <a:r>
+              <a:rPr lang="es-ES" sz="2800" dirty="0"/>
+              <a:t>	</a:t>
+            </a:r>
+            <a:endParaRPr lang="es-ES" sz="3200" dirty="0"/>
+          </a:p>
+          <a:p>
+            <a:endParaRPr lang="es-PE" dirty="0"/>
           </a:p>
         </p:txBody>
       </p:sp>
@@ -37097,8 +37502,8 @@
         </p:nvSpPr>
         <p:spPr>
           <a:xfrm>
-            <a:off x="1877472" y="215153"/>
-            <a:ext cx="2159566" cy="338554"/>
+            <a:off x="1474060" y="230801"/>
+            <a:ext cx="3023585" cy="338554"/>
           </a:xfrm>
           <a:prstGeom prst="rect">
             <a:avLst/>
@@ -37120,47 +37525,17 @@
                 <a:ea typeface="Fira Code" panose="020B0809050000020004" pitchFamily="49" charset="0"/>
                 <a:cs typeface="Fira Code" panose="020B0809050000020004" pitchFamily="49" charset="0"/>
               </a:rPr>
-              <a:t>Interfaz.package</a:t>
+              <a:t>Recomendaciones.package</a:t>
             </a:r>
           </a:p>
         </p:txBody>
       </p:sp>
       <p:pic>
         <p:nvPicPr>
-          <p:cNvPr id="6" name="Imagen 5">
+          <p:cNvPr id="3" name="Picture 2" descr="Historia de Python - Wikipedia, la enciclopedia libre">
             <a:extLst>
               <a:ext uri="{FF2B5EF4-FFF2-40B4-BE49-F238E27FC236}">
-                <a16:creationId xmlns:a16="http://schemas.microsoft.com/office/drawing/2014/main" id="{53B40E5B-E2B4-E597-8196-22A790B0587B}"/>
-              </a:ext>
-            </a:extLst>
-          </p:cNvPr>
-          <p:cNvPicPr>
-            <a:picLocks noChangeAspect="1"/>
-          </p:cNvPicPr>
-          <p:nvPr/>
-        </p:nvPicPr>
-        <p:blipFill>
-          <a:blip r:embed="rId2"/>
-          <a:stretch>
-            <a:fillRect/>
-          </a:stretch>
-        </p:blipFill>
-        <p:spPr>
-          <a:xfrm>
-            <a:off x="2254051" y="1427872"/>
-            <a:ext cx="8024555" cy="4755292"/>
-          </a:xfrm>
-          <a:prstGeom prst="rect">
-            <a:avLst/>
-          </a:prstGeom>
-        </p:spPr>
-      </p:pic>
-      <p:pic>
-        <p:nvPicPr>
-          <p:cNvPr id="9" name="Picture 2" descr="Historia de Python - Wikipedia, la enciclopedia libre">
-            <a:extLst>
-              <a:ext uri="{FF2B5EF4-FFF2-40B4-BE49-F238E27FC236}">
-                <a16:creationId xmlns:a16="http://schemas.microsoft.com/office/drawing/2014/main" id="{45112694-4317-345D-5036-81553784F435}"/>
+                <a16:creationId xmlns:a16="http://schemas.microsoft.com/office/drawing/2014/main" id="{A9B2CCA8-A936-7F2E-4CE2-CB6EFF8CEE78}"/>
               </a:ext>
             </a:extLst>
           </p:cNvPr>
@@ -37170,7 +37545,7 @@
           <p:nvPr/>
         </p:nvPicPr>
         <p:blipFill>
-          <a:blip r:embed="rId3">
+          <a:blip r:embed="rId2">
             <a:extLst>
               <a:ext uri="{28A0092B-C50C-407E-A947-70E740481C1C}">
                 <a14:useLocalDpi xmlns:a14="http://schemas.microsoft.com/office/drawing/2010/main" val="0"/>
@@ -37205,7 +37580,7 @@
     </p:spTree>
     <p:extLst>
       <p:ext uri="{BB962C8B-B14F-4D97-AF65-F5344CB8AC3E}">
-        <p14:creationId xmlns:p14="http://schemas.microsoft.com/office/powerpoint/2010/main" val="2557803807"/>
+        <p14:creationId xmlns:p14="http://schemas.microsoft.com/office/powerpoint/2010/main" val="1796107851"/>
       </p:ext>
     </p:extLst>
   </p:cSld>
@@ -37250,6 +37625,201 @@
         </p:nvSpPr>
         <p:spPr>
           <a:xfrm flipH="1">
+            <a:off x="755690" y="713872"/>
+            <a:ext cx="11678356" cy="714000"/>
+          </a:xfrm>
+        </p:spPr>
+        <p:txBody>
+          <a:bodyPr/>
+          <a:lstStyle/>
+          <a:p>
+            <a:r>
+              <a:rPr lang="es-ES" sz="4000" dirty="0"/>
+              <a:t>Interfaz y presentación </a:t>
+            </a:r>
+            <a:r>
+              <a:rPr lang="es-ES" sz="4000" dirty="0">
+                <a:solidFill>
+                  <a:schemeClr val="accent2"/>
+                </a:solidFill>
+              </a:rPr>
+              <a:t>“Paquete”</a:t>
+            </a:r>
+            <a:endParaRPr lang="es-PE" sz="4000" dirty="0">
+              <a:solidFill>
+                <a:schemeClr val="accent2"/>
+              </a:solidFill>
+            </a:endParaRPr>
+          </a:p>
+        </p:txBody>
+      </p:sp>
+      <p:sp>
+        <p:nvSpPr>
+          <p:cNvPr id="5" name="CuadroTexto 4">
+            <a:extLst>
+              <a:ext uri="{FF2B5EF4-FFF2-40B4-BE49-F238E27FC236}">
+                <a16:creationId xmlns:a16="http://schemas.microsoft.com/office/drawing/2014/main" id="{7B179020-E312-697F-533F-C5F3DE921764}"/>
+              </a:ext>
+            </a:extLst>
+          </p:cNvPr>
+          <p:cNvSpPr txBox="1"/>
+          <p:nvPr/>
+        </p:nvSpPr>
+        <p:spPr>
+          <a:xfrm>
+            <a:off x="1877472" y="215153"/>
+            <a:ext cx="2159566" cy="338554"/>
+          </a:xfrm>
+          <a:prstGeom prst="rect">
+            <a:avLst/>
+          </a:prstGeom>
+          <a:noFill/>
+        </p:spPr>
+        <p:txBody>
+          <a:bodyPr wrap="none" rtlCol="0">
+            <a:spAutoFit/>
+          </a:bodyPr>
+          <a:lstStyle/>
+          <a:p>
+            <a:r>
+              <a:rPr lang="es-ES" sz="1600" dirty="0">
+                <a:solidFill>
+                  <a:schemeClr val="accent6"/>
+                </a:solidFill>
+                <a:latin typeface="Fira Code" panose="020B0809050000020004" pitchFamily="49" charset="0"/>
+                <a:ea typeface="Fira Code" panose="020B0809050000020004" pitchFamily="49" charset="0"/>
+                <a:cs typeface="Fira Code" panose="020B0809050000020004" pitchFamily="49" charset="0"/>
+              </a:rPr>
+              <a:t>Interfaz.package</a:t>
+            </a:r>
+          </a:p>
+        </p:txBody>
+      </p:sp>
+      <p:pic>
+        <p:nvPicPr>
+          <p:cNvPr id="6" name="Imagen 5">
+            <a:extLst>
+              <a:ext uri="{FF2B5EF4-FFF2-40B4-BE49-F238E27FC236}">
+                <a16:creationId xmlns:a16="http://schemas.microsoft.com/office/drawing/2014/main" id="{53B40E5B-E2B4-E597-8196-22A790B0587B}"/>
+              </a:ext>
+            </a:extLst>
+          </p:cNvPr>
+          <p:cNvPicPr>
+            <a:picLocks noChangeAspect="1"/>
+          </p:cNvPicPr>
+          <p:nvPr/>
+        </p:nvPicPr>
+        <p:blipFill>
+          <a:blip r:embed="rId2"/>
+          <a:stretch>
+            <a:fillRect/>
+          </a:stretch>
+        </p:blipFill>
+        <p:spPr>
+          <a:xfrm>
+            <a:off x="2254051" y="1427872"/>
+            <a:ext cx="8024555" cy="4755292"/>
+          </a:xfrm>
+          <a:prstGeom prst="rect">
+            <a:avLst/>
+          </a:prstGeom>
+        </p:spPr>
+      </p:pic>
+      <p:pic>
+        <p:nvPicPr>
+          <p:cNvPr id="9" name="Picture 2" descr="Historia de Python - Wikipedia, la enciclopedia libre">
+            <a:extLst>
+              <a:ext uri="{FF2B5EF4-FFF2-40B4-BE49-F238E27FC236}">
+                <a16:creationId xmlns:a16="http://schemas.microsoft.com/office/drawing/2014/main" id="{45112694-4317-345D-5036-81553784F435}"/>
+              </a:ext>
+            </a:extLst>
+          </p:cNvPr>
+          <p:cNvPicPr>
+            <a:picLocks noChangeAspect="1" noChangeArrowheads="1"/>
+          </p:cNvPicPr>
+          <p:nvPr/>
+        </p:nvPicPr>
+        <p:blipFill>
+          <a:blip r:embed="rId3">
+            <a:extLst>
+              <a:ext uri="{28A0092B-C50C-407E-A947-70E740481C1C}">
+                <a14:useLocalDpi xmlns:a14="http://schemas.microsoft.com/office/drawing/2010/main" val="0"/>
+              </a:ext>
+            </a:extLst>
+          </a:blip>
+          <a:srcRect/>
+          <a:stretch>
+            <a:fillRect/>
+          </a:stretch>
+        </p:blipFill>
+        <p:spPr bwMode="auto">
+          <a:xfrm>
+            <a:off x="11356357" y="6089590"/>
+            <a:ext cx="701174" cy="768410"/>
+          </a:xfrm>
+          <a:prstGeom prst="rect">
+            <a:avLst/>
+          </a:prstGeom>
+          <a:noFill/>
+          <a:extLst>
+            <a:ext uri="{909E8E84-426E-40DD-AFC4-6F175D3DCCD1}">
+              <a14:hiddenFill xmlns:a14="http://schemas.microsoft.com/office/drawing/2010/main">
+                <a:solidFill>
+                  <a:srgbClr val="FFFFFF"/>
+                </a:solidFill>
+              </a14:hiddenFill>
+            </a:ext>
+          </a:extLst>
+        </p:spPr>
+      </p:pic>
+    </p:spTree>
+    <p:extLst>
+      <p:ext uri="{BB962C8B-B14F-4D97-AF65-F5344CB8AC3E}">
+        <p14:creationId xmlns:p14="http://schemas.microsoft.com/office/powerpoint/2010/main" val="2557803807"/>
+      </p:ext>
+    </p:extLst>
+  </p:cSld>
+  <p:clrMapOvr>
+    <a:masterClrMapping/>
+  </p:clrMapOvr>
+</p:sld>
+</file>
+
+<file path=ppt/slides/slide14.xml><?xml version="1.0" encoding="utf-8"?>
+<p:sld xmlns:a="http://schemas.openxmlformats.org/drawingml/2006/main" xmlns:r="http://schemas.openxmlformats.org/officeDocument/2006/relationships" xmlns:p="http://schemas.openxmlformats.org/presentationml/2006/main">
+  <p:cSld>
+    <p:spTree>
+      <p:nvGrpSpPr>
+        <p:cNvPr id="1" name=""/>
+        <p:cNvGrpSpPr/>
+        <p:nvPr/>
+      </p:nvGrpSpPr>
+      <p:grpSpPr>
+        <a:xfrm>
+          <a:off x="0" y="0"/>
+          <a:ext cx="0" cy="0"/>
+          <a:chOff x="0" y="0"/>
+          <a:chExt cx="0" cy="0"/>
+        </a:xfrm>
+      </p:grpSpPr>
+      <p:sp>
+        <p:nvSpPr>
+          <p:cNvPr id="2" name="Título 1">
+            <a:extLst>
+              <a:ext uri="{FF2B5EF4-FFF2-40B4-BE49-F238E27FC236}">
+                <a16:creationId xmlns:a16="http://schemas.microsoft.com/office/drawing/2014/main" id="{BC0E090F-2D32-F012-188F-9073CF6CB51F}"/>
+              </a:ext>
+            </a:extLst>
+          </p:cNvPr>
+          <p:cNvSpPr>
+            <a:spLocks noGrp="1"/>
+          </p:cNvSpPr>
+          <p:nvPr>
+            <p:ph type="title"/>
+          </p:nvPr>
+        </p:nvSpPr>
+        <p:spPr>
+          <a:xfrm flipH="1">
             <a:off x="1242441" y="701950"/>
             <a:ext cx="8905605" cy="714000"/>
           </a:xfrm>
@@ -37734,7 +38304,7 @@
 </p:sld>
 </file>
 
-<file path=ppt/slides/slide14.xml><?xml version="1.0" encoding="utf-8"?>
+<file path=ppt/slides/slide15.xml><?xml version="1.0" encoding="utf-8"?>
 <p:sld xmlns:a="http://schemas.openxmlformats.org/drawingml/2006/main" xmlns:r="http://schemas.openxmlformats.org/officeDocument/2006/relationships" xmlns:p="http://schemas.openxmlformats.org/presentationml/2006/main">
   <p:cSld>
     <p:spTree>
@@ -38923,7 +39493,7 @@
 </p:sld>
 </file>
 
-<file path=ppt/slides/slide15.xml><?xml version="1.0" encoding="utf-8"?>
+<file path=ppt/slides/slide16.xml><?xml version="1.0" encoding="utf-8"?>
 <p:sld xmlns:a="http://schemas.openxmlformats.org/drawingml/2006/main" xmlns:r="http://schemas.openxmlformats.org/officeDocument/2006/relationships" xmlns:p="http://schemas.openxmlformats.org/presentationml/2006/main">
   <p:cSld>
     <p:spTree>
@@ -40114,6 +40684,334 @@
           <a:chExt cx="0" cy="0"/>
         </a:xfrm>
       </p:grpSpPr>
+      <p:sp>
+        <p:nvSpPr>
+          <p:cNvPr id="688" name="Google Shape;688;p65"/>
+          <p:cNvSpPr/>
+          <p:nvPr/>
+        </p:nvSpPr>
+        <p:spPr>
+          <a:xfrm>
+            <a:off x="474549" y="180200"/>
+            <a:ext cx="9827643" cy="6359651"/>
+          </a:xfrm>
+          <a:prstGeom prst="snip2DiagRect">
+            <a:avLst>
+              <a:gd name="adj1" fmla="val 0"/>
+              <a:gd name="adj2" fmla="val 16667"/>
+            </a:avLst>
+          </a:prstGeom>
+          <a:solidFill>
+            <a:schemeClr val="dk1">
+              <a:alpha val="37990"/>
+            </a:schemeClr>
+          </a:solidFill>
+          <a:ln>
+            <a:noFill/>
+          </a:ln>
+        </p:spPr>
+        <p:txBody>
+          <a:bodyPr spcFirstLastPara="1" wrap="square" lIns="121900" tIns="121900" rIns="121900" bIns="121900" anchor="ctr" anchorCtr="0">
+            <a:noAutofit/>
+          </a:bodyPr>
+          <a:lstStyle/>
+          <a:p>
+            <a:endParaRPr sz="1867"/>
+          </a:p>
+        </p:txBody>
+      </p:sp>
+      <p:sp>
+        <p:nvSpPr>
+          <p:cNvPr id="689" name="Google Shape;689;p65"/>
+          <p:cNvSpPr/>
+          <p:nvPr/>
+        </p:nvSpPr>
+        <p:spPr>
+          <a:xfrm>
+            <a:off x="659383" y="365000"/>
+            <a:ext cx="9827643" cy="6174851"/>
+          </a:xfrm>
+          <a:prstGeom prst="snip2DiagRect">
+            <a:avLst>
+              <a:gd name="adj1" fmla="val 0"/>
+              <a:gd name="adj2" fmla="val 16667"/>
+            </a:avLst>
+          </a:prstGeom>
+          <a:noFill/>
+          <a:ln w="9525" cap="flat" cmpd="sng">
+            <a:solidFill>
+              <a:schemeClr val="lt1"/>
+            </a:solidFill>
+            <a:prstDash val="solid"/>
+            <a:round/>
+            <a:headEnd type="none" w="sm" len="sm"/>
+            <a:tailEnd type="none" w="sm" len="sm"/>
+          </a:ln>
+          <a:effectLst>
+            <a:outerShdw blurRad="100013" algn="bl" rotWithShape="0">
+              <a:schemeClr val="lt1">
+                <a:alpha val="70000"/>
+              </a:schemeClr>
+            </a:outerShdw>
+          </a:effectLst>
+        </p:spPr>
+        <p:txBody>
+          <a:bodyPr spcFirstLastPara="1" wrap="square" lIns="121900" tIns="121900" rIns="121900" bIns="121900" anchor="ctr" anchorCtr="0">
+            <a:noAutofit/>
+          </a:bodyPr>
+          <a:lstStyle/>
+          <a:p>
+            <a:endParaRPr sz="1867"/>
+          </a:p>
+        </p:txBody>
+      </p:sp>
+      <p:sp>
+        <p:nvSpPr>
+          <p:cNvPr id="690" name="Google Shape;690;p65"/>
+          <p:cNvSpPr txBox="1">
+            <a:spLocks noGrp="1"/>
+          </p:cNvSpPr>
+          <p:nvPr>
+            <p:ph type="title"/>
+          </p:nvPr>
+        </p:nvSpPr>
+        <p:spPr>
+          <a:xfrm>
+            <a:off x="1704975" y="587693"/>
+            <a:ext cx="6776800" cy="1122400"/>
+          </a:xfrm>
+          <a:prstGeom prst="rect">
+            <a:avLst/>
+          </a:prstGeom>
+        </p:spPr>
+        <p:txBody>
+          <a:bodyPr spcFirstLastPara="1" wrap="square" lIns="121900" tIns="121900" rIns="121900" bIns="121900" anchor="ctr" anchorCtr="0">
+            <a:noAutofit/>
+          </a:bodyPr>
+          <a:lstStyle/>
+          <a:p>
+            <a:r>
+              <a:rPr lang="en" dirty="0"/>
+              <a:t>PROBLEMATICA</a:t>
+            </a:r>
+            <a:endParaRPr dirty="0"/>
+          </a:p>
+        </p:txBody>
+      </p:sp>
+      <p:sp>
+        <p:nvSpPr>
+          <p:cNvPr id="691" name="Google Shape;691;p65"/>
+          <p:cNvSpPr txBox="1">
+            <a:spLocks noGrp="1"/>
+          </p:cNvSpPr>
+          <p:nvPr>
+            <p:ph type="subTitle" idx="1"/>
+          </p:nvPr>
+        </p:nvSpPr>
+        <p:spPr>
+          <a:xfrm>
+            <a:off x="1889808" y="2657233"/>
+            <a:ext cx="8412384" cy="2488491"/>
+          </a:xfrm>
+          <a:prstGeom prst="rect">
+            <a:avLst/>
+          </a:prstGeom>
+        </p:spPr>
+        <p:txBody>
+          <a:bodyPr spcFirstLastPara="1" wrap="square" lIns="121900" tIns="121900" rIns="121900" bIns="121900" anchor="ctr" anchorCtr="0">
+            <a:noAutofit/>
+          </a:bodyPr>
+          <a:lstStyle/>
+          <a:p>
+            <a:pPr marL="0" indent="0"/>
+            <a:r>
+              <a:rPr lang="es-ES" sz="2800" dirty="0"/>
+              <a:t>Es importante destacar que estas estimaciones pueden ser subestimadas debido a la falta de diagnósticos precisos y a la discriminación y estigmas sociales asociados con la depresión, que pueden dificultar que las personas busquen ayuda. Por lo tanto, el número real de personas que sufren de depresión puede ser mucho mayor.</a:t>
+            </a:r>
+            <a:endParaRPr sz="2800" dirty="0"/>
+          </a:p>
+        </p:txBody>
+      </p:sp>
+      <p:grpSp>
+        <p:nvGrpSpPr>
+          <p:cNvPr id="692" name="Google Shape;692;p65"/>
+          <p:cNvGrpSpPr/>
+          <p:nvPr/>
+        </p:nvGrpSpPr>
+        <p:grpSpPr>
+          <a:xfrm rot="5400000">
+            <a:off x="1031550" y="1490791"/>
+            <a:ext cx="1162016" cy="623405"/>
+            <a:chOff x="773350" y="518000"/>
+            <a:chExt cx="2757950" cy="1479600"/>
+          </a:xfrm>
+        </p:grpSpPr>
+        <p:sp>
+          <p:nvSpPr>
+            <p:cNvPr id="693" name="Google Shape;693;p65"/>
+            <p:cNvSpPr/>
+            <p:nvPr/>
+          </p:nvSpPr>
+          <p:spPr>
+            <a:xfrm>
+              <a:off x="2582700" y="518000"/>
+              <a:ext cx="948600" cy="1479600"/>
+            </a:xfrm>
+            <a:prstGeom prst="chevron">
+              <a:avLst>
+                <a:gd name="adj" fmla="val 50000"/>
+              </a:avLst>
+            </a:prstGeom>
+            <a:gradFill>
+              <a:gsLst>
+                <a:gs pos="0">
+                  <a:srgbClr val="FFFFFF">
+                    <a:alpha val="29803"/>
+                  </a:srgbClr>
+                </a:gs>
+                <a:gs pos="100000">
+                  <a:srgbClr val="FFFFFF">
+                    <a:alpha val="0"/>
+                  </a:srgbClr>
+                </a:gs>
+              </a:gsLst>
+              <a:lin ang="5400012" scaled="0"/>
+            </a:gradFill>
+            <a:ln>
+              <a:noFill/>
+            </a:ln>
+          </p:spPr>
+          <p:txBody>
+            <a:bodyPr spcFirstLastPara="1" wrap="square" lIns="121900" tIns="121900" rIns="121900" bIns="121900" anchor="ctr" anchorCtr="0">
+              <a:noAutofit/>
+            </a:bodyPr>
+            <a:lstStyle/>
+            <a:p>
+              <a:endParaRPr sz="1867"/>
+            </a:p>
+          </p:txBody>
+        </p:sp>
+        <p:sp>
+          <p:nvSpPr>
+            <p:cNvPr id="694" name="Google Shape;694;p65"/>
+            <p:cNvSpPr/>
+            <p:nvPr/>
+          </p:nvSpPr>
+          <p:spPr>
+            <a:xfrm>
+              <a:off x="1678025" y="518000"/>
+              <a:ext cx="948600" cy="1479600"/>
+            </a:xfrm>
+            <a:prstGeom prst="chevron">
+              <a:avLst>
+                <a:gd name="adj" fmla="val 50000"/>
+              </a:avLst>
+            </a:prstGeom>
+            <a:gradFill>
+              <a:gsLst>
+                <a:gs pos="0">
+                  <a:srgbClr val="FFFFFF">
+                    <a:alpha val="29803"/>
+                  </a:srgbClr>
+                </a:gs>
+                <a:gs pos="100000">
+                  <a:srgbClr val="FFFFFF">
+                    <a:alpha val="0"/>
+                  </a:srgbClr>
+                </a:gs>
+              </a:gsLst>
+              <a:lin ang="5400012" scaled="0"/>
+            </a:gradFill>
+            <a:ln>
+              <a:noFill/>
+            </a:ln>
+          </p:spPr>
+          <p:txBody>
+            <a:bodyPr spcFirstLastPara="1" wrap="square" lIns="121900" tIns="121900" rIns="121900" bIns="121900" anchor="ctr" anchorCtr="0">
+              <a:noAutofit/>
+            </a:bodyPr>
+            <a:lstStyle/>
+            <a:p>
+              <a:endParaRPr sz="1867"/>
+            </a:p>
+          </p:txBody>
+        </p:sp>
+        <p:sp>
+          <p:nvSpPr>
+            <p:cNvPr id="695" name="Google Shape;695;p65"/>
+            <p:cNvSpPr/>
+            <p:nvPr/>
+          </p:nvSpPr>
+          <p:spPr>
+            <a:xfrm>
+              <a:off x="773350" y="518000"/>
+              <a:ext cx="948600" cy="1479600"/>
+            </a:xfrm>
+            <a:prstGeom prst="chevron">
+              <a:avLst>
+                <a:gd name="adj" fmla="val 50000"/>
+              </a:avLst>
+            </a:prstGeom>
+            <a:gradFill>
+              <a:gsLst>
+                <a:gs pos="0">
+                  <a:srgbClr val="FFFFFF">
+                    <a:alpha val="29803"/>
+                  </a:srgbClr>
+                </a:gs>
+                <a:gs pos="100000">
+                  <a:srgbClr val="FFFFFF">
+                    <a:alpha val="0"/>
+                  </a:srgbClr>
+                </a:gs>
+              </a:gsLst>
+              <a:lin ang="5400012" scaled="0"/>
+            </a:gradFill>
+            <a:ln>
+              <a:noFill/>
+            </a:ln>
+          </p:spPr>
+          <p:txBody>
+            <a:bodyPr spcFirstLastPara="1" wrap="square" lIns="121900" tIns="121900" rIns="121900" bIns="121900" anchor="ctr" anchorCtr="0">
+              <a:noAutofit/>
+            </a:bodyPr>
+            <a:lstStyle/>
+            <a:p>
+              <a:endParaRPr sz="1867"/>
+            </a:p>
+          </p:txBody>
+        </p:sp>
+      </p:grpSp>
+    </p:spTree>
+    <p:extLst>
+      <p:ext uri="{BB962C8B-B14F-4D97-AF65-F5344CB8AC3E}">
+        <p14:creationId xmlns:p14="http://schemas.microsoft.com/office/powerpoint/2010/main" val="1124552705"/>
+      </p:ext>
+    </p:extLst>
+  </p:cSld>
+  <p:clrMapOvr>
+    <a:masterClrMapping/>
+  </p:clrMapOvr>
+</p:sld>
+</file>
+
+<file path=ppt/slides/slide4.xml><?xml version="1.0" encoding="utf-8"?>
+<p:sld xmlns:a="http://schemas.openxmlformats.org/drawingml/2006/main" xmlns:r="http://schemas.openxmlformats.org/officeDocument/2006/relationships" xmlns:p="http://schemas.openxmlformats.org/presentationml/2006/main">
+  <p:cSld>
+    <p:spTree>
+      <p:nvGrpSpPr>
+        <p:cNvPr id="1" name="Shape 687"/>
+        <p:cNvGrpSpPr/>
+        <p:nvPr/>
+      </p:nvGrpSpPr>
+      <p:grpSpPr>
+        <a:xfrm>
+          <a:off x="0" y="0"/>
+          <a:ext cx="0" cy="0"/>
+          <a:chOff x="0" y="0"/>
+          <a:chExt cx="0" cy="0"/>
+        </a:xfrm>
+      </p:grpSpPr>
       <p:grpSp>
         <p:nvGrpSpPr>
           <p:cNvPr id="692" name="Google Shape;692;p65"/>
@@ -43619,7 +44517,7 @@
 </p:sld>
 </file>
 
-<file path=ppt/slides/slide4.xml><?xml version="1.0" encoding="utf-8"?>
+<file path=ppt/slides/slide5.xml><?xml version="1.0" encoding="utf-8"?>
 <p:sld xmlns:a="http://schemas.openxmlformats.org/drawingml/2006/main" xmlns:r="http://schemas.openxmlformats.org/officeDocument/2006/relationships" xmlns:p="http://schemas.openxmlformats.org/presentationml/2006/main">
   <p:cSld>
     <p:spTree>
@@ -44795,7 +45693,7 @@
 </p:sld>
 </file>
 
-<file path=ppt/slides/slide5.xml><?xml version="1.0" encoding="utf-8"?>
+<file path=ppt/slides/slide6.xml><?xml version="1.0" encoding="utf-8"?>
 <p:sld xmlns:a="http://schemas.openxmlformats.org/drawingml/2006/main" xmlns:r="http://schemas.openxmlformats.org/officeDocument/2006/relationships" xmlns:p="http://schemas.openxmlformats.org/presentationml/2006/main">
   <p:cSld>
     <p:spTree>
@@ -49236,7 +50134,7 @@
 </p:sld>
 </file>
 
-<file path=ppt/slides/slide6.xml><?xml version="1.0" encoding="utf-8"?>
+<file path=ppt/slides/slide7.xml><?xml version="1.0" encoding="utf-8"?>
 <p:sld xmlns:a="http://schemas.openxmlformats.org/drawingml/2006/main" xmlns:r="http://schemas.openxmlformats.org/officeDocument/2006/relationships" xmlns:p="http://schemas.openxmlformats.org/presentationml/2006/main">
   <p:cSld>
     <p:spTree>
@@ -49582,7 +50480,7 @@
 </p:sld>
 </file>
 
-<file path=ppt/slides/slide7.xml><?xml version="1.0" encoding="utf-8"?>
+<file path=ppt/slides/slide8.xml><?xml version="1.0" encoding="utf-8"?>
 <p:sld xmlns:a="http://schemas.openxmlformats.org/drawingml/2006/main" xmlns:r="http://schemas.openxmlformats.org/officeDocument/2006/relationships" xmlns:p="http://schemas.openxmlformats.org/presentationml/2006/main">
   <p:cSld>
     <p:spTree>
@@ -49813,404 +50711,6 @@
     <p:extLst>
       <p:ext uri="{BB962C8B-B14F-4D97-AF65-F5344CB8AC3E}">
         <p14:creationId xmlns:p14="http://schemas.microsoft.com/office/powerpoint/2010/main" val="1346820223"/>
-      </p:ext>
-    </p:extLst>
-  </p:cSld>
-  <p:clrMapOvr>
-    <a:masterClrMapping/>
-  </p:clrMapOvr>
-</p:sld>
-</file>
-
-<file path=ppt/slides/slide8.xml><?xml version="1.0" encoding="utf-8"?>
-<p:sld xmlns:a="http://schemas.openxmlformats.org/drawingml/2006/main" xmlns:r="http://schemas.openxmlformats.org/officeDocument/2006/relationships" xmlns:p="http://schemas.openxmlformats.org/presentationml/2006/main">
-  <p:cSld>
-    <p:spTree>
-      <p:nvGrpSpPr>
-        <p:cNvPr id="1" name=""/>
-        <p:cNvGrpSpPr/>
-        <p:nvPr/>
-      </p:nvGrpSpPr>
-      <p:grpSpPr>
-        <a:xfrm>
-          <a:off x="0" y="0"/>
-          <a:ext cx="0" cy="0"/>
-          <a:chOff x="0" y="0"/>
-          <a:chExt cx="0" cy="0"/>
-        </a:xfrm>
-      </p:grpSpPr>
-      <p:sp>
-        <p:nvSpPr>
-          <p:cNvPr id="2" name="Título 1">
-            <a:extLst>
-              <a:ext uri="{FF2B5EF4-FFF2-40B4-BE49-F238E27FC236}">
-                <a16:creationId xmlns:a16="http://schemas.microsoft.com/office/drawing/2014/main" id="{BC0E090F-2D32-F012-188F-9073CF6CB51F}"/>
-              </a:ext>
-            </a:extLst>
-          </p:cNvPr>
-          <p:cNvSpPr>
-            <a:spLocks noGrp="1"/>
-          </p:cNvSpPr>
-          <p:nvPr>
-            <p:ph type="title"/>
-          </p:nvPr>
-        </p:nvSpPr>
-        <p:spPr>
-          <a:xfrm flipH="1">
-            <a:off x="1296232" y="782633"/>
-            <a:ext cx="5050779" cy="714000"/>
-          </a:xfrm>
-        </p:spPr>
-        <p:txBody>
-          <a:bodyPr/>
-          <a:lstStyle/>
-          <a:p>
-            <a:r>
-              <a:rPr lang="es-ES" sz="4000" dirty="0"/>
-              <a:t>Ayuda </a:t>
-            </a:r>
-            <a:r>
-              <a:rPr lang="es-ES" sz="4000" dirty="0">
-                <a:solidFill>
-                  <a:schemeClr val="accent2"/>
-                </a:solidFill>
-              </a:rPr>
-              <a:t>“Paquete”</a:t>
-            </a:r>
-            <a:endParaRPr lang="es-PE" sz="4000" dirty="0">
-              <a:solidFill>
-                <a:schemeClr val="accent2"/>
-              </a:solidFill>
-            </a:endParaRPr>
-          </a:p>
-        </p:txBody>
-      </p:sp>
-      <p:sp>
-        <p:nvSpPr>
-          <p:cNvPr id="4" name="Subtítulo 3">
-            <a:extLst>
-              <a:ext uri="{FF2B5EF4-FFF2-40B4-BE49-F238E27FC236}">
-                <a16:creationId xmlns:a16="http://schemas.microsoft.com/office/drawing/2014/main" id="{10D0C33B-6A9C-8DE9-0EC3-8C0AC40CF17F}"/>
-              </a:ext>
-            </a:extLst>
-          </p:cNvPr>
-          <p:cNvSpPr>
-            <a:spLocks noGrp="1"/>
-          </p:cNvSpPr>
-          <p:nvPr>
-            <p:ph type="subTitle" idx="1"/>
-          </p:nvPr>
-        </p:nvSpPr>
-        <p:spPr>
-          <a:xfrm>
-            <a:off x="2608281" y="2366209"/>
-            <a:ext cx="6975438" cy="3191908"/>
-          </a:xfrm>
-        </p:spPr>
-        <p:txBody>
-          <a:bodyPr/>
-          <a:lstStyle/>
-          <a:p>
-            <a:r>
-              <a:rPr lang="es-ES" sz="3200" dirty="0"/>
-              <a:t>//Presentación:</a:t>
-            </a:r>
-            <a:endParaRPr lang="es-PE" sz="3200" dirty="0"/>
-          </a:p>
-          <a:p>
-            <a:r>
-              <a:rPr lang="es-PE" sz="3200" dirty="0"/>
-              <a:t>	</a:t>
-            </a:r>
-            <a:r>
-              <a:rPr lang="es-PE" sz="3200" dirty="0">
-                <a:solidFill>
-                  <a:schemeClr val="tx2"/>
-                </a:solidFill>
-              </a:rPr>
-              <a:t>Menú de ayuda() </a:t>
-            </a:r>
-            <a:endParaRPr lang="es-PE" sz="3600" dirty="0">
-              <a:solidFill>
-                <a:schemeClr val="accent6"/>
-              </a:solidFill>
-            </a:endParaRPr>
-          </a:p>
-          <a:p>
-            <a:r>
-              <a:rPr lang="es-PE" sz="3200" dirty="0"/>
-              <a:t>	</a:t>
-            </a:r>
-            <a:r>
-              <a:rPr lang="es-PE" sz="3200" dirty="0">
-                <a:solidFill>
-                  <a:schemeClr val="accent4"/>
-                </a:solidFill>
-              </a:rPr>
-              <a:t>|</a:t>
-            </a:r>
-            <a:r>
-              <a:rPr lang="es-PE" sz="3200" dirty="0"/>
-              <a:t>	</a:t>
-            </a:r>
-            <a:r>
-              <a:rPr lang="es-PE" sz="3200" dirty="0">
-                <a:solidFill>
-                  <a:srgbClr val="92D050"/>
-                </a:solidFill>
-              </a:rPr>
-              <a:t>1) Ayuda psicológica.</a:t>
-            </a:r>
-          </a:p>
-          <a:p>
-            <a:r>
-              <a:rPr lang="es-PE" sz="3200" dirty="0">
-                <a:solidFill>
-                  <a:schemeClr val="accent6">
-                    <a:lumMod val="50000"/>
-                  </a:schemeClr>
-                </a:solidFill>
-              </a:rPr>
-              <a:t>	</a:t>
-            </a:r>
-            <a:r>
-              <a:rPr lang="es-PE" sz="3200" dirty="0">
-                <a:solidFill>
-                  <a:schemeClr val="accent4"/>
-                </a:solidFill>
-              </a:rPr>
-              <a:t>|</a:t>
-            </a:r>
-            <a:r>
-              <a:rPr lang="es-PE" sz="3200" dirty="0">
-                <a:solidFill>
-                  <a:schemeClr val="accent6">
-                    <a:lumMod val="50000"/>
-                  </a:schemeClr>
-                </a:solidFill>
-              </a:rPr>
-              <a:t>	//Letras de canciones</a:t>
-            </a:r>
-            <a:endParaRPr lang="es-PE" sz="3200" dirty="0">
-              <a:solidFill>
-                <a:srgbClr val="92D050"/>
-              </a:solidFill>
-            </a:endParaRPr>
-          </a:p>
-          <a:p>
-            <a:r>
-              <a:rPr lang="es-PE" sz="3200" dirty="0"/>
-              <a:t>	</a:t>
-            </a:r>
-            <a:r>
-              <a:rPr lang="es-PE" sz="3200" dirty="0">
-                <a:solidFill>
-                  <a:schemeClr val="accent4"/>
-                </a:solidFill>
-              </a:rPr>
-              <a:t>|</a:t>
-            </a:r>
-            <a:r>
-              <a:rPr lang="es-PE" sz="3200" dirty="0"/>
-              <a:t>		</a:t>
-            </a:r>
-            <a:r>
-              <a:rPr lang="es-PE" sz="3200" dirty="0">
-                <a:solidFill>
-                  <a:schemeClr val="tx2"/>
-                </a:solidFill>
-              </a:rPr>
-              <a:t>Motivación()</a:t>
-            </a:r>
-          </a:p>
-          <a:p>
-            <a:r>
-              <a:rPr lang="es-PE" sz="3200" dirty="0">
-                <a:solidFill>
-                  <a:srgbClr val="92D050"/>
-                </a:solidFill>
-              </a:rPr>
-              <a:t>	</a:t>
-            </a:r>
-            <a:r>
-              <a:rPr lang="es-PE" sz="3200" dirty="0">
-                <a:solidFill>
-                  <a:schemeClr val="accent4"/>
-                </a:solidFill>
-              </a:rPr>
-              <a:t>|</a:t>
-            </a:r>
-            <a:r>
-              <a:rPr lang="es-PE" sz="3200" dirty="0">
-                <a:solidFill>
-                  <a:srgbClr val="92D050"/>
-                </a:solidFill>
-              </a:rPr>
-              <a:t>	2) Ayuda en tarea.</a:t>
-            </a:r>
-          </a:p>
-          <a:p>
-            <a:r>
-              <a:rPr lang="es-PE" sz="3200" dirty="0"/>
-              <a:t>	</a:t>
-            </a:r>
-            <a:r>
-              <a:rPr lang="es-PE" sz="3200" dirty="0">
-                <a:solidFill>
-                  <a:schemeClr val="accent4"/>
-                </a:solidFill>
-              </a:rPr>
-              <a:t>|	</a:t>
-            </a:r>
-            <a:r>
-              <a:rPr lang="es-PE" sz="3200" dirty="0"/>
-              <a:t>	</a:t>
-            </a:r>
-            <a:r>
-              <a:rPr lang="es-PE" sz="3200" dirty="0">
-                <a:solidFill>
-                  <a:schemeClr val="tx2"/>
-                </a:solidFill>
-              </a:rPr>
-              <a:t>Aprender cantando()</a:t>
-            </a:r>
-          </a:p>
-          <a:p>
-            <a:r>
-              <a:rPr lang="es-PE" sz="3200" dirty="0"/>
-              <a:t>	</a:t>
-            </a:r>
-            <a:r>
-              <a:rPr lang="es-PE" sz="3200" dirty="0">
-                <a:solidFill>
-                  <a:schemeClr val="accent4"/>
-                </a:solidFill>
-              </a:rPr>
-              <a:t>|</a:t>
-            </a:r>
-            <a:r>
-              <a:rPr lang="es-PE" sz="3200" dirty="0"/>
-              <a:t>	</a:t>
-            </a:r>
-            <a:r>
-              <a:rPr lang="es-PE" sz="3200" dirty="0">
-                <a:solidFill>
-                  <a:srgbClr val="92D050"/>
-                </a:solidFill>
-              </a:rPr>
-              <a:t>3) Volver.</a:t>
-            </a:r>
-          </a:p>
-          <a:p>
-            <a:r>
-              <a:rPr lang="es-PE" sz="3200" dirty="0">
-                <a:solidFill>
-                  <a:srgbClr val="92D050"/>
-                </a:solidFill>
-              </a:rPr>
-              <a:t>	</a:t>
-            </a:r>
-            <a:endParaRPr lang="es-ES" sz="3200" dirty="0">
-              <a:solidFill>
-                <a:schemeClr val="accent6"/>
-              </a:solidFill>
-            </a:endParaRPr>
-          </a:p>
-        </p:txBody>
-      </p:sp>
-      <p:sp>
-        <p:nvSpPr>
-          <p:cNvPr id="5" name="CuadroTexto 4">
-            <a:extLst>
-              <a:ext uri="{FF2B5EF4-FFF2-40B4-BE49-F238E27FC236}">
-                <a16:creationId xmlns:a16="http://schemas.microsoft.com/office/drawing/2014/main" id="{7B179020-E312-697F-533F-C5F3DE921764}"/>
-              </a:ext>
-            </a:extLst>
-          </p:cNvPr>
-          <p:cNvSpPr txBox="1"/>
-          <p:nvPr/>
-        </p:nvSpPr>
-        <p:spPr>
-          <a:xfrm>
-            <a:off x="1877472" y="215153"/>
-            <a:ext cx="1789272" cy="338554"/>
-          </a:xfrm>
-          <a:prstGeom prst="rect">
-            <a:avLst/>
-          </a:prstGeom>
-          <a:noFill/>
-        </p:spPr>
-        <p:txBody>
-          <a:bodyPr wrap="none" rtlCol="0">
-            <a:spAutoFit/>
-          </a:bodyPr>
-          <a:lstStyle/>
-          <a:p>
-            <a:r>
-              <a:rPr lang="es-ES" sz="1600" dirty="0">
-                <a:solidFill>
-                  <a:schemeClr val="accent6"/>
-                </a:solidFill>
-                <a:latin typeface="Fira Code" panose="020B0809050000020004" pitchFamily="49" charset="0"/>
-                <a:ea typeface="Fira Code" panose="020B0809050000020004" pitchFamily="49" charset="0"/>
-                <a:cs typeface="Fira Code" panose="020B0809050000020004" pitchFamily="49" charset="0"/>
-              </a:rPr>
-              <a:t>Ayuda.package</a:t>
-            </a:r>
-          </a:p>
-        </p:txBody>
-      </p:sp>
-      <p:pic>
-        <p:nvPicPr>
-          <p:cNvPr id="3" name="Picture 2" descr="Historia de Python - Wikipedia, la enciclopedia libre">
-            <a:extLst>
-              <a:ext uri="{FF2B5EF4-FFF2-40B4-BE49-F238E27FC236}">
-                <a16:creationId xmlns:a16="http://schemas.microsoft.com/office/drawing/2014/main" id="{9F9B9726-1468-8927-AA67-F263938EC2C6}"/>
-              </a:ext>
-            </a:extLst>
-          </p:cNvPr>
-          <p:cNvPicPr>
-            <a:picLocks noChangeAspect="1" noChangeArrowheads="1"/>
-          </p:cNvPicPr>
-          <p:nvPr/>
-        </p:nvPicPr>
-        <p:blipFill>
-          <a:blip r:embed="rId2">
-            <a:extLst>
-              <a:ext uri="{28A0092B-C50C-407E-A947-70E740481C1C}">
-                <a14:useLocalDpi xmlns:a14="http://schemas.microsoft.com/office/drawing/2010/main" val="0"/>
-              </a:ext>
-            </a:extLst>
-          </a:blip>
-          <a:srcRect/>
-          <a:stretch>
-            <a:fillRect/>
-          </a:stretch>
-        </p:blipFill>
-        <p:spPr bwMode="auto">
-          <a:xfrm>
-            <a:off x="11356357" y="6089590"/>
-            <a:ext cx="701174" cy="768410"/>
-          </a:xfrm>
-          <a:prstGeom prst="rect">
-            <a:avLst/>
-          </a:prstGeom>
-          <a:noFill/>
-          <a:extLst>
-            <a:ext uri="{909E8E84-426E-40DD-AFC4-6F175D3DCCD1}">
-              <a14:hiddenFill xmlns:a14="http://schemas.microsoft.com/office/drawing/2010/main">
-                <a:solidFill>
-                  <a:srgbClr val="FFFFFF"/>
-                </a:solidFill>
-              </a14:hiddenFill>
-            </a:ext>
-          </a:extLst>
-        </p:spPr>
-      </p:pic>
-    </p:spTree>
-    <p:extLst>
-      <p:ext uri="{BB962C8B-B14F-4D97-AF65-F5344CB8AC3E}">
-        <p14:creationId xmlns:p14="http://schemas.microsoft.com/office/powerpoint/2010/main" val="315560256"/>
       </p:ext>
     </p:extLst>
   </p:cSld>
@@ -50255,8 +50755,8 @@
         </p:nvSpPr>
         <p:spPr>
           <a:xfrm flipH="1">
-            <a:off x="1296231" y="782633"/>
-            <a:ext cx="5884497" cy="714000"/>
+            <a:off x="1296232" y="782633"/>
+            <a:ext cx="5050779" cy="714000"/>
           </a:xfrm>
         </p:spPr>
         <p:txBody>
@@ -50265,7 +50765,7 @@
           <a:p>
             <a:r>
               <a:rPr lang="es-ES" sz="4000" dirty="0"/>
-              <a:t>Chistes </a:t>
+              <a:t>Ayuda </a:t>
             </a:r>
             <a:r>
               <a:rPr lang="es-ES" sz="4000" dirty="0">
@@ -50301,8 +50801,8 @@
         </p:nvSpPr>
         <p:spPr>
           <a:xfrm>
-            <a:off x="2895539" y="1921304"/>
-            <a:ext cx="7725416" cy="4508234"/>
+            <a:off x="2608281" y="2366209"/>
+            <a:ext cx="6975438" cy="3191908"/>
           </a:xfrm>
         </p:spPr>
         <p:txBody>
@@ -50311,17 +50811,24 @@
           <a:p>
             <a:r>
               <a:rPr lang="es-ES" sz="3200" dirty="0"/>
+              <a:t>//Presentación:</a:t>
+            </a:r>
+            <a:endParaRPr lang="es-PE" sz="3200" dirty="0"/>
+          </a:p>
+          <a:p>
+            <a:r>
+              <a:rPr lang="es-PE" sz="3200" dirty="0"/>
               <a:t>	</a:t>
             </a:r>
             <a:r>
-              <a:rPr lang="es-ES" sz="3200" dirty="0">
+              <a:rPr lang="es-PE" sz="3200" dirty="0">
                 <a:solidFill>
                   <a:schemeClr val="tx2"/>
                 </a:solidFill>
               </a:rPr>
-              <a:t>Menú Chistes() </a:t>
-            </a:r>
-            <a:endParaRPr lang="es-ES" sz="3600" dirty="0">
+              <a:t>Menú de ayuda() </a:t>
+            </a:r>
+            <a:endParaRPr lang="es-PE" sz="3600" dirty="0">
               <a:solidFill>
                 <a:schemeClr val="accent6"/>
               </a:solidFill>
@@ -50329,15 +50836,43 @@
           </a:p>
           <a:p>
             <a:r>
-              <a:rPr lang="es-ES" sz="3200" dirty="0">
+              <a:rPr lang="es-PE" sz="3200" dirty="0"/>
+              <a:t>	</a:t>
+            </a:r>
+            <a:r>
+              <a:rPr lang="es-PE" sz="3200" dirty="0">
+                <a:solidFill>
+                  <a:schemeClr val="accent4"/>
+                </a:solidFill>
+              </a:rPr>
+              <a:t>|</a:t>
+            </a:r>
+            <a:r>
+              <a:rPr lang="es-PE" sz="3200" dirty="0"/>
+              <a:t>	</a:t>
+            </a:r>
+            <a:r>
+              <a:rPr lang="es-PE" sz="3200" dirty="0">
                 <a:solidFill>
                   <a:srgbClr val="92D050"/>
+                </a:solidFill>
+              </a:rPr>
+              <a:t>1) Ayuda psicológica.</a:t>
+            </a:r>
+          </a:p>
+          <a:p>
+            <a:r>
+              <a:rPr lang="es-PE" sz="3200" dirty="0">
+                <a:solidFill>
+                  <a:schemeClr val="accent6">
+                    <a:lumMod val="50000"/>
+                  </a:schemeClr>
                 </a:solidFill>
               </a:rPr>
               <a:t>	</a:t>
             </a:r>
             <a:r>
-              <a:rPr lang="es-ES" sz="3200" dirty="0">
+              <a:rPr lang="es-PE" sz="3200" dirty="0">
                 <a:solidFill>
                   <a:schemeClr val="accent4"/>
                 </a:solidFill>
@@ -50345,21 +50880,28 @@
               <a:t>|</a:t>
             </a:r>
             <a:r>
-              <a:rPr lang="es-ES" sz="3200" dirty="0">
-                <a:solidFill>
-                  <a:srgbClr val="92D050"/>
+              <a:rPr lang="es-PE" sz="3200" dirty="0">
+                <a:solidFill>
+                  <a:schemeClr val="accent6">
+                    <a:lumMod val="50000"/>
+                  </a:schemeClr>
                 </a:solidFill>
               </a:rPr>
-              <a:t>	1) Chistes Blancos</a:t>
-            </a:r>
-          </a:p>
-          <a:p>
-            <a:r>
-              <a:rPr lang="es-ES" sz="3200" dirty="0"/>
+              <a:t>	//Letras de canciones</a:t>
+            </a:r>
+            <a:endParaRPr lang="es-PE" sz="3200" dirty="0">
+              <a:solidFill>
+                <a:srgbClr val="92D050"/>
+              </a:solidFill>
+            </a:endParaRPr>
+          </a:p>
+          <a:p>
+            <a:r>
+              <a:rPr lang="es-PE" sz="3200" dirty="0"/>
               <a:t>	</a:t>
             </a:r>
             <a:r>
-              <a:rPr lang="es-ES" sz="3200" dirty="0">
+              <a:rPr lang="es-PE" sz="3200" dirty="0">
                 <a:solidFill>
                   <a:schemeClr val="accent4"/>
                 </a:solidFill>
@@ -50367,25 +50909,29 @@
               <a:t>|</a:t>
             </a:r>
             <a:r>
-              <a:rPr lang="es-ES" sz="3200" dirty="0"/>
+              <a:rPr lang="es-PE" sz="3200" dirty="0"/>
               <a:t>		</a:t>
             </a:r>
             <a:r>
-              <a:rPr lang="es-ES" sz="3200" dirty="0">
+              <a:rPr lang="es-PE" sz="3200" dirty="0">
                 <a:solidFill>
                   <a:schemeClr val="tx2"/>
                 </a:solidFill>
               </a:rPr>
-              <a:t>Contenido().</a:t>
-            </a:r>
-          </a:p>
-          <a:p>
-            <a:r>
-              <a:rPr lang="es-ES" sz="3200" dirty="0"/>
+              <a:t>Motivación()</a:t>
+            </a:r>
+          </a:p>
+          <a:p>
+            <a:r>
+              <a:rPr lang="es-PE" sz="3200" dirty="0">
+                <a:solidFill>
+                  <a:srgbClr val="92D050"/>
+                </a:solidFill>
+              </a:rPr>
               <a:t>	</a:t>
             </a:r>
             <a:r>
-              <a:rPr lang="es-ES" sz="3200" dirty="0">
+              <a:rPr lang="es-PE" sz="3200" dirty="0">
                 <a:solidFill>
                   <a:schemeClr val="accent4"/>
                 </a:solidFill>
@@ -50393,25 +50939,47 @@
               <a:t>|</a:t>
             </a:r>
             <a:r>
-              <a:rPr lang="es-ES" sz="3200" dirty="0"/>
+              <a:rPr lang="es-PE" sz="3200" dirty="0">
+                <a:solidFill>
+                  <a:srgbClr val="92D050"/>
+                </a:solidFill>
+              </a:rPr>
+              <a:t>	2) Ayuda en tarea.</a:t>
+            </a:r>
+          </a:p>
+          <a:p>
+            <a:r>
+              <a:rPr lang="es-PE" sz="3200" dirty="0"/>
               <a:t>	</a:t>
             </a:r>
             <a:r>
-              <a:rPr lang="es-ES" sz="3200" dirty="0">
-                <a:solidFill>
-                  <a:srgbClr val="92D050"/>
+              <a:rPr lang="es-PE" sz="3200" dirty="0">
+                <a:solidFill>
+                  <a:schemeClr val="accent4"/>
                 </a:solidFill>
               </a:rPr>
-              <a:t>2) Chistes buenos</a:t>
-            </a:r>
-          </a:p>
-          <a:p>
-            <a:r>
-              <a:rPr lang="es-ES" sz="3200" dirty="0"/>
+              <a:t>|	</a:t>
+            </a:r>
+            <a:r>
+              <a:rPr lang="es-PE" sz="3200" dirty="0"/>
               <a:t>	</a:t>
             </a:r>
             <a:r>
-              <a:rPr lang="es-ES" sz="3200" dirty="0">
+              <a:rPr lang="es-PE" sz="3200" dirty="0">
+                <a:solidFill>
+                  <a:schemeClr val="tx2"/>
+                </a:solidFill>
+              </a:rPr>
+              <a:t>Aprender cantando()</a:t>
+            </a:r>
+          </a:p>
+          <a:p>
+            <a:r>
+              <a:rPr lang="es-PE" sz="3200" dirty="0"/>
+              <a:t>	</a:t>
+            </a:r>
+            <a:r>
+              <a:rPr lang="es-PE" sz="3200" dirty="0">
                 <a:solidFill>
                   <a:schemeClr val="accent4"/>
                 </a:solidFill>
@@ -50419,158 +50987,28 @@
               <a:t>|</a:t>
             </a:r>
             <a:r>
-              <a:rPr lang="es-ES" sz="3200" dirty="0"/>
-              <a:t>		</a:t>
-            </a:r>
-            <a:r>
-              <a:rPr lang="es-ES" sz="3200" dirty="0">
-                <a:solidFill>
-                  <a:schemeClr val="tx2"/>
+              <a:rPr lang="es-PE" sz="3200" dirty="0"/>
+              <a:t>	</a:t>
+            </a:r>
+            <a:r>
+              <a:rPr lang="es-PE" sz="3200" dirty="0">
+                <a:solidFill>
+                  <a:srgbClr val="92D050"/>
                 </a:solidFill>
               </a:rPr>
-              <a:t>Contenido().</a:t>
-            </a:r>
-          </a:p>
-          <a:p>
-            <a:r>
-              <a:rPr lang="es-ES" sz="3200" dirty="0"/>
-              <a:t>	</a:t>
-            </a:r>
-            <a:r>
-              <a:rPr lang="es-ES" sz="3200" dirty="0">
-                <a:solidFill>
-                  <a:schemeClr val="accent4"/>
-                </a:solidFill>
-              </a:rPr>
-              <a:t>|</a:t>
-            </a:r>
-            <a:r>
-              <a:rPr lang="es-ES" sz="3200" dirty="0"/>
-              <a:t>	</a:t>
-            </a:r>
-            <a:r>
-              <a:rPr lang="es-ES" sz="3200" dirty="0">
-                <a:solidFill>
-                  <a:srgbClr val="92D050"/>
-                </a:solidFill>
-              </a:rPr>
-              <a:t>3) Chistes inteligentes</a:t>
-            </a:r>
-          </a:p>
-          <a:p>
-            <a:r>
-              <a:rPr lang="es-ES" sz="3200" dirty="0"/>
-              <a:t>	</a:t>
-            </a:r>
-            <a:r>
-              <a:rPr lang="es-ES" sz="3200" dirty="0">
-                <a:solidFill>
-                  <a:schemeClr val="accent4"/>
-                </a:solidFill>
-              </a:rPr>
-              <a:t>|</a:t>
-            </a:r>
-            <a:r>
-              <a:rPr lang="es-ES" sz="3200" dirty="0"/>
-              <a:t>		</a:t>
-            </a:r>
-            <a:r>
-              <a:rPr lang="es-ES" sz="3200" dirty="0">
-                <a:solidFill>
-                  <a:schemeClr val="tx2"/>
-                </a:solidFill>
-              </a:rPr>
-              <a:t>Contenido().</a:t>
-            </a:r>
-          </a:p>
-          <a:p>
-            <a:r>
-              <a:rPr lang="es-ES" sz="3200" dirty="0"/>
-              <a:t>	</a:t>
-            </a:r>
-            <a:r>
-              <a:rPr lang="es-ES" sz="3200" dirty="0">
-                <a:solidFill>
-                  <a:schemeClr val="accent4"/>
-                </a:solidFill>
-              </a:rPr>
-              <a:t>|</a:t>
-            </a:r>
-            <a:r>
-              <a:rPr lang="es-ES" sz="3200" dirty="0"/>
-              <a:t>	</a:t>
-            </a:r>
-            <a:r>
-              <a:rPr lang="es-ES" sz="3200" dirty="0">
-                <a:solidFill>
-                  <a:srgbClr val="92D050"/>
-                </a:solidFill>
-              </a:rPr>
-              <a:t>4) Chistes rojos</a:t>
-            </a:r>
-          </a:p>
-          <a:p>
-            <a:r>
-              <a:rPr lang="es-ES" sz="3200" dirty="0"/>
-              <a:t>	</a:t>
-            </a:r>
-            <a:r>
-              <a:rPr lang="es-ES" sz="3200" dirty="0">
-                <a:solidFill>
-                  <a:schemeClr val="accent4"/>
-                </a:solidFill>
-              </a:rPr>
-              <a:t>|</a:t>
-            </a:r>
-            <a:r>
-              <a:rPr lang="es-ES" sz="3200" dirty="0"/>
-              <a:t>		</a:t>
-            </a:r>
-            <a:r>
-              <a:rPr lang="es-ES" sz="3200" dirty="0">
-                <a:solidFill>
-                  <a:schemeClr val="tx2"/>
-                </a:solidFill>
-              </a:rPr>
-              <a:t>Contenido().</a:t>
-            </a:r>
-          </a:p>
-          <a:p>
-            <a:r>
-              <a:rPr lang="es-ES" sz="3200" dirty="0"/>
-              <a:t>	</a:t>
-            </a:r>
-            <a:r>
-              <a:rPr lang="es-ES" sz="3200" dirty="0">
-                <a:solidFill>
-                  <a:schemeClr val="accent4"/>
-                </a:solidFill>
-              </a:rPr>
-              <a:t>|</a:t>
-            </a:r>
-            <a:r>
-              <a:rPr lang="es-ES" sz="3200" dirty="0"/>
-              <a:t>	</a:t>
-            </a:r>
-            <a:r>
-              <a:rPr lang="es-ES" sz="3200" dirty="0">
-                <a:solidFill>
-                  <a:srgbClr val="92D050"/>
-                </a:solidFill>
-              </a:rPr>
-              <a:t>5) Volver</a:t>
-            </a:r>
-          </a:p>
-          <a:p>
-            <a:r>
-              <a:rPr lang="es-ES" sz="3200" dirty="0">
+              <a:t>3) Volver.</a:t>
+            </a:r>
+          </a:p>
+          <a:p>
+            <a:r>
+              <a:rPr lang="es-PE" sz="3200" dirty="0">
                 <a:solidFill>
                   <a:srgbClr val="92D050"/>
                 </a:solidFill>
               </a:rPr>
               <a:t>	</a:t>
             </a:r>
-            <a:endParaRPr lang="es-PE" sz="3200" dirty="0">
+            <a:endParaRPr lang="es-ES" sz="3200" dirty="0">
               <a:solidFill>
                 <a:schemeClr val="accent6"/>
               </a:solidFill>
@@ -50593,7 +51031,7 @@
         <p:spPr>
           <a:xfrm>
             <a:off x="1877472" y="215153"/>
-            <a:ext cx="2036135" cy="338554"/>
+            <a:ext cx="1789272" cy="338554"/>
           </a:xfrm>
           <a:prstGeom prst="rect">
             <a:avLst/>
@@ -50615,7 +51053,7 @@
                 <a:ea typeface="Fira Code" panose="020B0809050000020004" pitchFamily="49" charset="0"/>
                 <a:cs typeface="Fira Code" panose="020B0809050000020004" pitchFamily="49" charset="0"/>
               </a:rPr>
-              <a:t>Chistes.package</a:t>
+              <a:t>Ayuda.package</a:t>
             </a:r>
           </a:p>
         </p:txBody>
@@ -50625,7 +51063,7 @@
           <p:cNvPr id="3" name="Picture 2" descr="Historia de Python - Wikipedia, la enciclopedia libre">
             <a:extLst>
               <a:ext uri="{FF2B5EF4-FFF2-40B4-BE49-F238E27FC236}">
-                <a16:creationId xmlns:a16="http://schemas.microsoft.com/office/drawing/2014/main" id="{3CA948B0-4182-097C-3647-301A3095EB18}"/>
+                <a16:creationId xmlns:a16="http://schemas.microsoft.com/office/drawing/2014/main" id="{9F9B9726-1468-8927-AA67-F263938EC2C6}"/>
               </a:ext>
             </a:extLst>
           </p:cNvPr>
@@ -50670,7 +51108,7 @@
     </p:spTree>
     <p:extLst>
       <p:ext uri="{BB962C8B-B14F-4D97-AF65-F5344CB8AC3E}">
-        <p14:creationId xmlns:p14="http://schemas.microsoft.com/office/powerpoint/2010/main" val="2379966933"/>
+        <p14:creationId xmlns:p14="http://schemas.microsoft.com/office/powerpoint/2010/main" val="315560256"/>
       </p:ext>
     </p:extLst>
   </p:cSld>

</xml_diff>